<commit_message>
fix interaction bug between ldebug and views
</commit_message>
<xml_diff>
--- a/doc/lmake_doc.pptx
+++ b/doc/lmake_doc.pptx
@@ -36,22 +36,17 @@
     <p:sldId id="269" r:id="rId30"/>
     <p:sldId id="270" r:id="rId31"/>
     <p:sldId id="271" r:id="rId32"/>
-    <p:sldId id="277" r:id="rId33"/>
-    <p:sldId id="288" r:id="rId34"/>
-    <p:sldId id="287" r:id="rId35"/>
-    <p:sldId id="279" r:id="rId36"/>
-    <p:sldId id="289" r:id="rId37"/>
-    <p:sldId id="290" r:id="rId38"/>
-    <p:sldId id="298" r:id="rId39"/>
-    <p:sldId id="300" r:id="rId40"/>
-    <p:sldId id="301" r:id="rId41"/>
-    <p:sldId id="299" r:id="rId42"/>
-    <p:sldId id="296" r:id="rId43"/>
-    <p:sldId id="293" r:id="rId44"/>
-    <p:sldId id="306" r:id="rId45"/>
-    <p:sldId id="305" r:id="rId46"/>
-    <p:sldId id="304" r:id="rId47"/>
-    <p:sldId id="294" r:id="rId48"/>
+    <p:sldId id="287" r:id="rId33"/>
+    <p:sldId id="279" r:id="rId34"/>
+    <p:sldId id="289" r:id="rId35"/>
+    <p:sldId id="290" r:id="rId36"/>
+    <p:sldId id="298" r:id="rId37"/>
+    <p:sldId id="300" r:id="rId38"/>
+    <p:sldId id="301" r:id="rId39"/>
+    <p:sldId id="299" r:id="rId40"/>
+    <p:sldId id="296" r:id="rId41"/>
+    <p:sldId id="293" r:id="rId42"/>
+    <p:sldId id="304" r:id="rId43"/>
   </p:sldIdLst>
   <p:sldSz cx="12192000" cy="6858000"/>
   <p:notesSz cx="6858000" cy="9144000"/>
@@ -307,7 +302,7 @@
           <a:p>
             <a:fld id="{695ACB9B-D058-F740-96D9-D98C2191715E}" type="datetimeFigureOut">
               <a:rPr lang="en-US" smtClean="0"/>
-              <a:t>3/29/23</a:t>
+              <a:t>9/12/24</a:t>
             </a:fld>
             <a:endParaRPr lang="en-US"/>
           </a:p>
@@ -507,7 +502,7 @@
           <a:p>
             <a:fld id="{695ACB9B-D058-F740-96D9-D98C2191715E}" type="datetimeFigureOut">
               <a:rPr lang="en-US" smtClean="0"/>
-              <a:t>3/29/23</a:t>
+              <a:t>9/12/24</a:t>
             </a:fld>
             <a:endParaRPr lang="en-US"/>
           </a:p>
@@ -717,7 +712,7 @@
           <a:p>
             <a:fld id="{695ACB9B-D058-F740-96D9-D98C2191715E}" type="datetimeFigureOut">
               <a:rPr lang="en-US" smtClean="0"/>
-              <a:t>3/29/23</a:t>
+              <a:t>9/12/24</a:t>
             </a:fld>
             <a:endParaRPr lang="en-US"/>
           </a:p>
@@ -917,7 +912,7 @@
           <a:p>
             <a:fld id="{695ACB9B-D058-F740-96D9-D98C2191715E}" type="datetimeFigureOut">
               <a:rPr lang="en-US" smtClean="0"/>
-              <a:t>3/29/23</a:t>
+              <a:t>9/12/24</a:t>
             </a:fld>
             <a:endParaRPr lang="en-US"/>
           </a:p>
@@ -1193,7 +1188,7 @@
           <a:p>
             <a:fld id="{695ACB9B-D058-F740-96D9-D98C2191715E}" type="datetimeFigureOut">
               <a:rPr lang="en-US" smtClean="0"/>
-              <a:t>3/29/23</a:t>
+              <a:t>9/12/24</a:t>
             </a:fld>
             <a:endParaRPr lang="en-US"/>
           </a:p>
@@ -1461,7 +1456,7 @@
           <a:p>
             <a:fld id="{695ACB9B-D058-F740-96D9-D98C2191715E}" type="datetimeFigureOut">
               <a:rPr lang="en-US" smtClean="0"/>
-              <a:t>3/29/23</a:t>
+              <a:t>9/12/24</a:t>
             </a:fld>
             <a:endParaRPr lang="en-US"/>
           </a:p>
@@ -1876,7 +1871,7 @@
           <a:p>
             <a:fld id="{695ACB9B-D058-F740-96D9-D98C2191715E}" type="datetimeFigureOut">
               <a:rPr lang="en-US" smtClean="0"/>
-              <a:t>3/29/23</a:t>
+              <a:t>9/12/24</a:t>
             </a:fld>
             <a:endParaRPr lang="en-US"/>
           </a:p>
@@ -2018,7 +2013,7 @@
           <a:p>
             <a:fld id="{695ACB9B-D058-F740-96D9-D98C2191715E}" type="datetimeFigureOut">
               <a:rPr lang="en-US" smtClean="0"/>
-              <a:t>3/29/23</a:t>
+              <a:t>9/12/24</a:t>
             </a:fld>
             <a:endParaRPr lang="en-US"/>
           </a:p>
@@ -2131,7 +2126,7 @@
           <a:p>
             <a:fld id="{695ACB9B-D058-F740-96D9-D98C2191715E}" type="datetimeFigureOut">
               <a:rPr lang="en-US" smtClean="0"/>
-              <a:t>3/29/23</a:t>
+              <a:t>9/12/24</a:t>
             </a:fld>
             <a:endParaRPr lang="en-US"/>
           </a:p>
@@ -2444,7 +2439,7 @@
           <a:p>
             <a:fld id="{695ACB9B-D058-F740-96D9-D98C2191715E}" type="datetimeFigureOut">
               <a:rPr lang="en-US" smtClean="0"/>
-              <a:t>3/29/23</a:t>
+              <a:t>9/12/24</a:t>
             </a:fld>
             <a:endParaRPr lang="en-US"/>
           </a:p>
@@ -2733,7 +2728,7 @@
           <a:p>
             <a:fld id="{695ACB9B-D058-F740-96D9-D98C2191715E}" type="datetimeFigureOut">
               <a:rPr lang="en-US" smtClean="0"/>
-              <a:t>3/29/23</a:t>
+              <a:t>9/12/24</a:t>
             </a:fld>
             <a:endParaRPr lang="en-US"/>
           </a:p>
@@ -2976,7 +2971,7 @@
           <a:p>
             <a:fld id="{695ACB9B-D058-F740-96D9-D98C2191715E}" type="datetimeFigureOut">
               <a:rPr lang="en-US" smtClean="0"/>
-              <a:t>3/29/23</a:t>
+              <a:t>9/12/24</a:t>
             </a:fld>
             <a:endParaRPr lang="en-US"/>
           </a:p>
@@ -4097,8 +4092,8 @@
         </p:nvSpPr>
         <p:spPr>
           <a:xfrm>
-            <a:off x="838200" y="1825625"/>
-            <a:ext cx="10515600" cy="1946928"/>
+            <a:off x="838200" y="1635470"/>
+            <a:ext cx="10515600" cy="2137083"/>
           </a:xfrm>
         </p:spPr>
         <p:txBody>
@@ -4117,15 +4112,45 @@
             </a:r>
           </a:p>
           <a:p>
+            <a:pPr lvl="1"/>
+            <a:r>
+              <a:rPr lang="en-US" sz="1400" dirty="0"/>
+              <a:t>a 5</a:t>
+            </a:r>
+            <a:r>
+              <a:rPr lang="en-US" sz="1400" baseline="30000" dirty="0"/>
+              <a:t>th</a:t>
+            </a:r>
+            <a:r>
+              <a:rPr lang="en-US" sz="1400" dirty="0"/>
+              <a:t> method, fuse, is under development</a:t>
+            </a:r>
+          </a:p>
+          <a:p>
             <a:r>
               <a:rPr lang="en-US" sz="1800" dirty="0"/>
-              <a:t>In all 4 cases, the LMAKE_AUTODEP_ENV environment variable is defined to contain the details of how to record file accesses</a:t>
+              <a:t>In all cases, the LMAKE_AUTODEP_ENV environment variable is defined to contain the details of how to record file accesses</a:t>
             </a:r>
           </a:p>
           <a:p>
             <a:r>
               <a:rPr lang="en-US" sz="1800" dirty="0"/>
-              <a:t>If a job needs to remote execute some parts of it, it must transport the LMAKE_AUTODEP_ENV and depending on the method, LD_AUDIT or LD_PRELOAD variable, and the remote execution will be instrumented</a:t>
+              <a:t>If a job needs to remote execute some parts of it, it must transport LMAKE_AUTODEP_ENV and, depending on the method, LD_AUDIT or LD_PRELOAD variable, so that the remote execution is instrumented</a:t>
+            </a:r>
+          </a:p>
+          <a:p>
+            <a:pPr lvl="1"/>
+            <a:r>
+              <a:rPr lang="en-US" sz="1400" dirty="0"/>
+              <a:t>remote execution is not supported with the </a:t>
+            </a:r>
+            <a:r>
+              <a:rPr lang="en-US" sz="1400" dirty="0" err="1"/>
+              <a:t>ptrace</a:t>
+            </a:r>
+            <a:r>
+              <a:rPr lang="en-US" sz="1400" dirty="0"/>
+              <a:t> method</a:t>
             </a:r>
           </a:p>
         </p:txBody>
@@ -4584,14 +4609,14 @@
           <p:nvPr>
             <p:extLst>
               <p:ext uri="{D42A27DB-BD31-4B8C-83A1-F6EECF244321}">
-                <p14:modId xmlns:p14="http://schemas.microsoft.com/office/powerpoint/2010/main" val="2273430471"/>
+                <p14:modId xmlns:p14="http://schemas.microsoft.com/office/powerpoint/2010/main" val="4213188276"/>
               </p:ext>
             </p:extLst>
           </p:nvPr>
         </p:nvGraphicFramePr>
         <p:xfrm>
           <a:off x="1004865" y="1690688"/>
-          <a:ext cx="10243507" cy="3210560"/>
+          <a:ext cx="10243507" cy="3759200"/>
         </p:xfrm>
         <a:graphic>
           <a:graphicData uri="http://schemas.openxmlformats.org/drawingml/2006/table">
@@ -4767,6 +4792,24 @@
                         <a:t>requires seccomp, which means a recent kernel version (5.13?)</a:t>
                       </a:r>
                     </a:p>
+                    <a:p>
+                      <a:pPr marL="285750" indent="-285750">
+                        <a:buFont typeface="Arial" panose="020B0604020202020204" pitchFamily="34" charset="0"/>
+                        <a:buChar char="•"/>
+                      </a:pPr>
+                      <a:r>
+                        <a:rPr lang="en-US" dirty="0"/>
+                        <a:t>Does not </a:t>
+                      </a:r>
+                      <a:r>
+                        <a:rPr lang="en-US" dirty="0" err="1"/>
+                        <a:t>suport</a:t>
+                      </a:r>
+                      <a:r>
+                        <a:rPr lang="en-US" dirty="0"/>
+                        <a:t> remote execution within the job</a:t>
+                      </a:r>
+                    </a:p>
                   </a:txBody>
                   <a:tcPr/>
                 </a:tc>
@@ -4823,7 +4866,7 @@
                       </a:r>
                       <a:r>
                         <a:rPr lang="en-US" dirty="0"/>
-                        <a:t> is dynamically loaded</a:t>
+                        <a:t> be dynamically loaded</a:t>
                       </a:r>
                     </a:p>
                     <a:p>
@@ -4903,7 +4946,7 @@
                       </a:r>
                       <a:r>
                         <a:rPr lang="en-US" dirty="0"/>
-                        <a:t> is dynamically loaded</a:t>
+                        <a:t> be dynamically loaded</a:t>
                       </a:r>
                     </a:p>
                     <a:p>
@@ -4913,7 +4956,15 @@
                       </a:pPr>
                       <a:r>
                         <a:rPr lang="en-US" dirty="0"/>
-                        <a:t>does some calls to malloc during file access, which in turn requires that malloc does not file access (which is the case with the </a:t>
+                        <a:t>does some calls to malloc during file access, which in turn requires that malloc </a:t>
+                      </a:r>
+                      <a:r>
+                        <a:rPr lang="en-US" dirty="0" err="1"/>
+                        <a:t>accesse</a:t>
+                      </a:r>
+                      <a:r>
+                        <a:rPr lang="en-US" dirty="0"/>
+                        <a:t> no file (which is the case with the </a:t>
                       </a:r>
                       <a:r>
                         <a:rPr lang="en-US" dirty="0" err="1"/>
@@ -4921,7 +4972,15 @@
                       </a:r>
                       <a:r>
                         <a:rPr lang="en-US" dirty="0"/>
-                        <a:t> provided malloc, but not necessarily if malloc is hijacked by some other libs)</a:t>
+                        <a:t> provided malloc, but not necessarily if malloc is hijacked by some other libs such as </a:t>
+                      </a:r>
+                      <a:r>
+                        <a:rPr lang="en-US" dirty="0" err="1"/>
+                        <a:t>jemalloc</a:t>
+                      </a:r>
+                      <a:r>
+                        <a:rPr lang="en-US" dirty="0"/>
+                        <a:t>)</a:t>
                       </a:r>
                     </a:p>
                   </a:txBody>
@@ -5014,7 +5073,7 @@
         <p:spPr/>
         <p:txBody>
           <a:bodyPr>
-            <a:normAutofit lnSpcReduction="10000"/>
+            <a:normAutofit fontScale="92500" lnSpcReduction="10000"/>
           </a:bodyPr>
           <a:lstStyle/>
           <a:p>
@@ -5042,40 +5101,56 @@
             <a:pPr lvl="1"/>
             <a:r>
               <a:rPr lang="en-US" dirty="0"/>
-              <a:t>And implementing a heart beat to avoid being stuck if a job vanishes without leaving an address</a:t>
-            </a:r>
-          </a:p>
-          <a:p>
-            <a:r>
-              <a:rPr lang="en-US" dirty="0"/>
-              <a:t>A local backend is currently implemented</a:t>
+              <a:t>And implementing a heart beat to avoid being stuck if a job vanishes for any reason</a:t>
+            </a:r>
+          </a:p>
+          <a:p>
+            <a:r>
+              <a:rPr lang="en-US" dirty="0"/>
+              <a:t>Currently implemented backends :</a:t>
             </a:r>
           </a:p>
           <a:p>
             <a:pPr lvl="1"/>
             <a:r>
               <a:rPr lang="en-US" dirty="0"/>
-              <a:t>launches jobs on the local host</a:t>
+              <a:t>Local</a:t>
+            </a:r>
+          </a:p>
+          <a:p>
+            <a:pPr lvl="2"/>
+            <a:r>
+              <a:rPr lang="en-US" dirty="0"/>
+              <a:t>Launches jobs on the local host</a:t>
+            </a:r>
+          </a:p>
+          <a:p>
+            <a:pPr lvl="2"/>
+            <a:r>
+              <a:rPr lang="en-US" dirty="0"/>
+              <a:t>Handles user configurable resources</a:t>
+            </a:r>
+          </a:p>
+          <a:p>
+            <a:pPr lvl="3"/>
+            <a:r>
+              <a:rPr lang="en-US" dirty="0"/>
+              <a:t>resources are local to a repository, though</a:t>
             </a:r>
           </a:p>
           <a:p>
             <a:pPr lvl="1"/>
             <a:r>
-              <a:rPr lang="en-US" dirty="0"/>
-              <a:t>Handles user configurable resources</a:t>
-            </a:r>
+              <a:rPr lang="en-US" dirty="0" err="1"/>
+              <a:t>Slurm</a:t>
+            </a:r>
+            <a:endParaRPr lang="en-US" dirty="0"/>
           </a:p>
           <a:p>
             <a:pPr lvl="2"/>
             <a:r>
               <a:rPr lang="en-US" dirty="0"/>
-              <a:t>resources are local to a repository, though</a:t>
-            </a:r>
-          </a:p>
-          <a:p>
-            <a:r>
-              <a:rPr lang="en-US" dirty="0"/>
-              <a:t>A </a:t>
+              <a:t>Jobs are submitted using the </a:t>
             </a:r>
             <a:r>
               <a:rPr lang="en-US" dirty="0" err="1"/>
@@ -5083,14 +5158,27 @@
             </a:r>
             <a:r>
               <a:rPr lang="en-US" dirty="0"/>
-              <a:t> backend will be implemented shortly</a:t>
-            </a:r>
-          </a:p>
-          <a:p>
-            <a:r>
-              <a:rPr lang="en-US" dirty="0"/>
-              <a:t>The README file details how to implement a new backend</a:t>
-            </a:r>
+              <a:t> API</a:t>
+            </a:r>
+          </a:p>
+          <a:p>
+            <a:pPr lvl="1"/>
+            <a:r>
+              <a:rPr lang="en-US" dirty="0"/>
+              <a:t>SGE</a:t>
+            </a:r>
+          </a:p>
+          <a:p>
+            <a:pPr lvl="2"/>
+            <a:r>
+              <a:rPr lang="en-US" dirty="0"/>
+              <a:t>Jobs are submitted with </a:t>
+            </a:r>
+            <a:r>
+              <a:rPr lang="en-US" dirty="0" err="1"/>
+              <a:t>qsub</a:t>
+            </a:r>
+            <a:endParaRPr lang="en-US" dirty="0"/>
           </a:p>
         </p:txBody>
       </p:sp>
@@ -5218,15 +5306,29 @@
             <a:pPr lvl="1"/>
             <a:r>
               <a:rPr lang="en-US" dirty="0"/>
-              <a:t>A </a:t>
+              <a:t>A checksum is computed on each target</a:t>
+            </a:r>
+          </a:p>
+          <a:p>
+            <a:pPr lvl="2"/>
+            <a:r>
+              <a:rPr lang="en-US" dirty="0"/>
+              <a:t>Modifications are detected by checksum changes, not dates</a:t>
+            </a:r>
+            <a:br>
+              <a:rPr lang="en-US" dirty="0"/>
+            </a:br>
+            <a:r>
+              <a:rPr lang="en-US" dirty="0"/>
+              <a:t>Uses </a:t>
             </a:r>
             <a:r>
               <a:rPr lang="en-US" dirty="0" err="1"/>
-              <a:t>crc</a:t>
-            </a:r>
-            <a:r>
-              <a:rPr lang="en-US" dirty="0"/>
-              <a:t> is computed on each target</a:t>
+              <a:t>xxh</a:t>
+            </a:r>
+            <a:r>
+              <a:rPr lang="en-US" dirty="0"/>
+              <a:t>, which is extremely fast and robust</a:t>
             </a:r>
           </a:p>
         </p:txBody>
@@ -5333,19 +5435,6 @@
             </a:r>
             <a:r>
               <a:rPr lang="en-US" dirty="0"/>
-              <a:t> &lt;bar &gt;foo</a:t>
-            </a:r>
-          </a:p>
-          <a:p>
-            <a:pPr marL="457200" lvl="1" indent="0">
-              <a:buNone/>
-            </a:pPr>
-            <a:r>
-              <a:rPr lang="en-US" dirty="0" err="1"/>
-              <a:t>my_tool</a:t>
-            </a:r>
-            <a:r>
-              <a:rPr lang="en-US" dirty="0"/>
               <a:t> &lt;$&lt; &gt;$@</a:t>
             </a:r>
           </a:p>
@@ -5672,7 +5761,7 @@
             </a:r>
             <a:r>
               <a:rPr lang="en-US" dirty="0"/>
-              <a:t> = ‘</a:t>
+              <a:t> = ’</a:t>
             </a:r>
             <a:r>
               <a:rPr lang="en-US" dirty="0" err="1"/>
@@ -5680,29 +5769,7 @@
             </a:r>
             <a:r>
               <a:rPr lang="en-US" dirty="0"/>
-              <a:t> &lt;bar &gt;foo’</a:t>
-            </a:r>
-          </a:p>
-          <a:p>
-            <a:pPr marL="457200" lvl="1" indent="0">
-              <a:buFont typeface="Arial" panose="020B0604020202020204" pitchFamily="34" charset="0"/>
-              <a:buNone/>
-            </a:pPr>
-            <a:r>
-              <a:rPr lang="en-US" dirty="0" err="1"/>
-              <a:t>cmd</a:t>
-            </a:r>
-            <a:r>
-              <a:rPr lang="en-US" dirty="0"/>
-              <a:t> = ‘</a:t>
-            </a:r>
-            <a:r>
-              <a:rPr lang="en-US" dirty="0" err="1"/>
-              <a:t>my_tool</a:t>
-            </a:r>
-            <a:r>
-              <a:rPr lang="en-US" dirty="0"/>
-              <a:t> &lt;$SRC &gt;$DST’</a:t>
+              <a:t> &lt;{SRC} &gt;{DST}’</a:t>
             </a:r>
           </a:p>
         </p:txBody>
@@ -5822,7 +5889,7 @@
           <a:p>
             <a:r>
               <a:rPr lang="en-US" dirty="0"/>
-              <a:t>Already, in the 2nd command, we see that it is much easier to read with </a:t>
+              <a:t>Already we see that it is much easier to read with </a:t>
             </a:r>
             <a:r>
               <a:rPr lang="en-US" dirty="0" err="1"/>
@@ -6004,8 +6071,8 @@
         </p:nvSpPr>
         <p:spPr>
           <a:xfrm>
-            <a:off x="838200" y="1825625"/>
-            <a:ext cx="5257800" cy="4351338"/>
+            <a:off x="838201" y="1825625"/>
+            <a:ext cx="3294888" cy="4351338"/>
           </a:xfrm>
         </p:spPr>
         <p:txBody>
@@ -6025,12 +6092,8 @@
               <a:buNone/>
             </a:pPr>
             <a:r>
-              <a:rPr lang="en-US" dirty="0" err="1"/>
-              <a:t>my_tool</a:t>
-            </a:r>
-            <a:r>
-              <a:rPr lang="en-US" dirty="0"/>
-              <a:t> &lt;$&lt; &gt;$@</a:t>
+              <a:rPr lang="en-US" dirty="0"/>
+              <a:t>cat &lt;$&lt; &gt;$@</a:t>
             </a:r>
           </a:p>
         </p:txBody>
@@ -6049,8 +6112,8 @@
         </p:nvSpPr>
         <p:spPr>
           <a:xfrm>
-            <a:off x="838200" y="1402915"/>
-            <a:ext cx="5257800" cy="369332"/>
+            <a:off x="838200" y="1427519"/>
+            <a:ext cx="3294888" cy="369332"/>
           </a:xfrm>
           <a:prstGeom prst="rect">
             <a:avLst/>
@@ -6085,8 +6148,8 @@
         </p:nvSpPr>
         <p:spPr>
           <a:xfrm>
-            <a:off x="6095999" y="1402915"/>
-            <a:ext cx="5257799" cy="369332"/>
+            <a:off x="4786229" y="1402915"/>
+            <a:ext cx="6567569" cy="369332"/>
           </a:xfrm>
           <a:prstGeom prst="rect">
             <a:avLst/>
@@ -6124,8 +6187,8 @@
         </p:nvSpPr>
         <p:spPr>
           <a:xfrm>
-            <a:off x="6096000" y="1825625"/>
-            <a:ext cx="5257800" cy="4351338"/>
+            <a:off x="4786231" y="1825625"/>
+            <a:ext cx="6567569" cy="4351338"/>
           </a:xfrm>
           <a:prstGeom prst="rect">
             <a:avLst/>
@@ -6301,7 +6364,6 @@
           </a:lstStyle>
           <a:p>
             <a:pPr marL="0" indent="0">
-              <a:buFont typeface="Arial" panose="020B0604020202020204" pitchFamily="34" charset="0"/>
               <a:buNone/>
             </a:pPr>
             <a:r>
@@ -6327,12 +6389,11 @@
           </a:p>
           <a:p>
             <a:pPr marL="457200" lvl="1" indent="0">
-              <a:buFont typeface="Arial" panose="020B0604020202020204" pitchFamily="34" charset="0"/>
               <a:buNone/>
             </a:pPr>
             <a:r>
               <a:rPr lang="en-US" dirty="0"/>
-              <a:t>stems = { ‘File’ : ’.*’ }</a:t>
+              <a:t>stems = {’ File’ : ’.+’ }</a:t>
             </a:r>
           </a:p>
           <a:p>
@@ -6342,7 +6403,7 @@
             </a:pPr>
             <a:r>
               <a:rPr lang="en-US" dirty="0"/>
-              <a:t>targets = { ‘DST’ : ‘{File}.foo’ }</a:t>
+              <a:t>targets = { ’DST’ : ’{File}.foo’ }</a:t>
             </a:r>
           </a:p>
           <a:p>
@@ -6352,7 +6413,7 @@
             </a:pPr>
             <a:r>
               <a:rPr lang="en-US" dirty="0"/>
-              <a:t>deps = { ‘SRC’ : ‘{File}.bar’ }</a:t>
+              <a:t>deps = { ’SRC’ : ’{File}.bar’ }</a:t>
             </a:r>
           </a:p>
           <a:p>
@@ -6360,21 +6421,59 @@
               <a:buFont typeface="Arial" panose="020B0604020202020204" pitchFamily="34" charset="0"/>
               <a:buNone/>
             </a:pPr>
+            <a:r>
+              <a:rPr lang="en-US" dirty="0"/>
+              <a:t>def </a:t>
+            </a:r>
             <a:r>
               <a:rPr lang="en-US" dirty="0" err="1"/>
               <a:t>cmd</a:t>
             </a:r>
             <a:r>
               <a:rPr lang="en-US" dirty="0"/>
-              <a:t> = ‘</a:t>
+              <a:t>() : # either python command</a:t>
+            </a:r>
+          </a:p>
+          <a:p>
+            <a:pPr marL="457200" lvl="1" indent="0">
+              <a:buFont typeface="Arial" panose="020B0604020202020204" pitchFamily="34" charset="0"/>
+              <a:buNone/>
+            </a:pPr>
+            <a:r>
+              <a:rPr lang="en-US" dirty="0"/>
+              <a:t>	c = open(SRC).read()</a:t>
+            </a:r>
+          </a:p>
+          <a:p>
+            <a:pPr marL="457200" lvl="1" indent="0">
+              <a:buFont typeface="Arial" panose="020B0604020202020204" pitchFamily="34" charset="0"/>
+              <a:buNone/>
+            </a:pPr>
+            <a:r>
+              <a:rPr lang="en-US" dirty="0"/>
+              <a:t>	open(</a:t>
             </a:r>
             <a:r>
               <a:rPr lang="en-US" dirty="0" err="1"/>
-              <a:t>my_tool</a:t>
-            </a:r>
-            <a:r>
-              <a:rPr lang="en-US" dirty="0"/>
-              <a:t> &lt;$SRC &gt;$DST’</a:t>
+              <a:t>DST,’w</a:t>
+            </a:r>
+            <a:r>
+              <a:rPr lang="en-US" dirty="0"/>
+              <a:t>’).write(c)</a:t>
+            </a:r>
+          </a:p>
+          <a:p>
+            <a:pPr marL="457200" lvl="1" indent="0">
+              <a:buFont typeface="Arial" panose="020B0604020202020204" pitchFamily="34" charset="0"/>
+              <a:buNone/>
+            </a:pPr>
+            <a:r>
+              <a:rPr lang="en-US" dirty="0" err="1"/>
+              <a:t>cmd</a:t>
+            </a:r>
+            <a:r>
+              <a:rPr lang="en-US" dirty="0"/>
+              <a:t> = ’cat &lt;{SRC} &gt;{DST}’ # or bash command</a:t>
             </a:r>
           </a:p>
         </p:txBody>
@@ -6460,7 +6559,14 @@
           <a:p>
             <a:r>
               <a:rPr lang="en-US" dirty="0"/>
-              <a:t>make : the stem is a wildcard (can be any sequence of chars)</a:t>
+              <a:t>make</a:t>
+            </a:r>
+          </a:p>
+          <a:p>
+            <a:pPr lvl="1"/>
+            <a:r>
+              <a:rPr lang="en-US" dirty="0"/>
+              <a:t>the stem is a wildcard (can be any sequence of chars)</a:t>
             </a:r>
           </a:p>
           <a:p>
@@ -6468,9 +6574,20 @@
               <a:rPr lang="en-US" dirty="0" err="1"/>
               <a:t>lmake</a:t>
             </a:r>
-            <a:r>
-              <a:rPr lang="en-US" dirty="0"/>
-              <a:t> : the stem can be any regular expression</a:t>
+            <a:endParaRPr lang="en-US" dirty="0"/>
+          </a:p>
+          <a:p>
+            <a:pPr lvl="1"/>
+            <a:r>
+              <a:rPr lang="en-US" dirty="0"/>
+              <a:t>the stem can be any regular expression</a:t>
+            </a:r>
+          </a:p>
+          <a:p>
+            <a:pPr lvl="1"/>
+            <a:r>
+              <a:rPr lang="en-US" dirty="0"/>
+              <a:t>there may be several stems</a:t>
             </a:r>
           </a:p>
         </p:txBody>
@@ -6568,7 +6685,7 @@
           <a:p>
             <a:r>
               <a:rPr lang="en-US" dirty="0"/>
-              <a:t> dep values are f-string’s evaluated in a context containing</a:t>
+              <a:t> dep values follow f-string syntax evaluated in a context containing</a:t>
             </a:r>
           </a:p>
           <a:p>
@@ -6749,7 +6866,7 @@
             <a:pPr lvl="2"/>
             <a:r>
               <a:rPr lang="en-US" dirty="0"/>
-              <a:t>environment contains, in addition to what is mentioned in config, variables for stems, targets, deps, resources and tokens as soon as they appear as a word in the value</a:t>
+              <a:t>It is interpreted as a f-string with stems, targets, deps and resources in the context</a:t>
             </a:r>
           </a:p>
           <a:p>
@@ -6763,7 +6880,7 @@
             <a:pPr lvl="2"/>
             <a:r>
               <a:rPr lang="en-US" dirty="0"/>
-              <a:t>context contains stems, targets, deps, resources and tokens as soon as they are referenced (directly or indirectly)</a:t>
+              <a:t>context contains stems, targets, deps and resources</a:t>
             </a:r>
           </a:p>
         </p:txBody>
@@ -6857,7 +6974,7 @@
           <a:p>
             <a:r>
               <a:rPr lang="en-US" dirty="0"/>
-              <a:t>However, attributes listed in the combine attribute have a special treatment during inheritance : they are combined</a:t>
+              <a:t>However, most attributes (listed in the combine attribute) have a special treatment during inheritance : they are combined</a:t>
             </a:r>
           </a:p>
           <a:p>
@@ -6931,7 +7048,7 @@
             <a:pPr lvl="1"/>
             <a:r>
               <a:rPr lang="en-US" dirty="0"/>
-              <a:t>if str, they are concatenated, separated by \n</a:t>
+              <a:t>if str, they are concatenated, separated by newlines</a:t>
             </a:r>
           </a:p>
           <a:p>
@@ -6955,7 +7072,7 @@
             </a:r>
             <a:r>
               <a:rPr lang="en-US" dirty="0"/>
-              <a:t> for the precise list of combine at the top level</a:t>
+              <a:t> for the precise list of combined attributes at the top level</a:t>
             </a:r>
           </a:p>
         </p:txBody>
@@ -7183,6 +7300,15 @@
               <a:buNone/>
             </a:pPr>
             <a:r>
+              <a:rPr lang="en-US" sz="2400" dirty="0"/>
+              <a:t>Not supported</a:t>
+            </a:r>
+          </a:p>
+          <a:p>
+            <a:pPr marL="0" indent="0">
+              <a:buNone/>
+            </a:pPr>
+            <a:r>
               <a:rPr lang="en-US" sz="2000" dirty="0"/>
               <a:t>%.foo1 %.foo2 : %.bar</a:t>
             </a:r>
@@ -7198,6 +7324,15 @@
             <a:r>
               <a:rPr lang="en-US" sz="2000" dirty="0"/>
               <a:t> &lt;$&lt; &gt;$*.foo1 2&gt;$*.foo2</a:t>
+            </a:r>
+          </a:p>
+          <a:p>
+            <a:pPr marL="0" indent="0">
+              <a:buNone/>
+            </a:pPr>
+            <a:r>
+              <a:rPr lang="en-US" sz="2400" dirty="0"/>
+              <a:t>This job is executed twice if both files are needed</a:t>
             </a:r>
           </a:p>
         </p:txBody>
@@ -7472,6 +7607,26 @@
               <a:buNone/>
             </a:pPr>
             <a:r>
+              <a:rPr lang="en-US" sz="2400" dirty="0"/>
+              <a:t>Supported</a:t>
+            </a:r>
+          </a:p>
+          <a:p>
+            <a:pPr marL="0" indent="0">
+              <a:buFont typeface="Arial" panose="020B0604020202020204" pitchFamily="34" charset="0"/>
+              <a:buNone/>
+            </a:pPr>
+            <a:r>
+              <a:rPr lang="en-US" sz="2400" dirty="0"/>
+              <a:t>The job is meant to generate both targets in a single run</a:t>
+            </a:r>
+          </a:p>
+          <a:p>
+            <a:pPr marL="0" indent="0">
+              <a:buFont typeface="Arial" panose="020B0604020202020204" pitchFamily="34" charset="0"/>
+              <a:buNone/>
+            </a:pPr>
+            <a:r>
               <a:rPr lang="en-US" sz="2000" dirty="0"/>
               <a:t>class </a:t>
             </a:r>
@@ -7571,7 +7726,7 @@
             </a:r>
             <a:r>
               <a:rPr lang="en-US" sz="2000" dirty="0"/>
-              <a:t> &lt;$SRC &gt;$DST1 2&gt;$DST2’</a:t>
+              <a:t> &lt;{SRC} &gt;{DST1} 2&gt;{DST2}’</a:t>
             </a:r>
           </a:p>
         </p:txBody>
@@ -8994,12 +9149,7 @@
             <p:ph idx="1"/>
           </p:nvPr>
         </p:nvSpPr>
-        <p:spPr>
-          <a:xfrm>
-            <a:off x="838200" y="1825625"/>
-            <a:ext cx="10515600" cy="2207756"/>
-          </a:xfrm>
-        </p:spPr>
+        <p:spPr/>
         <p:txBody>
           <a:bodyPr/>
           <a:lstStyle/>
@@ -9036,7 +9186,7 @@
             </a:pPr>
             <a:r>
               <a:rPr lang="en-US" dirty="0"/>
-              <a:t>stems = { ‘File’ : ’.*’ }</a:t>
+              <a:t>stems = { ’File’ : ’.*’ }</a:t>
             </a:r>
           </a:p>
           <a:p>
@@ -9046,7 +9196,7 @@
             </a:pPr>
             <a:r>
               <a:rPr lang="en-US" dirty="0"/>
-              <a:t>targets = { ‘DST’ : ( ‘{File}.foo’ , flags , … ) }</a:t>
+              <a:t>targets = { ’DST’ : ’{File}.foo’ }</a:t>
             </a:r>
           </a:p>
           <a:p>
@@ -9056,7 +9206,7 @@
             </a:pPr>
             <a:r>
               <a:rPr lang="en-US" dirty="0"/>
-              <a:t>deps = { ‘SRC’ : ‘{File}.bar’ }</a:t>
+              <a:t>deps = { ’SRC’ : ’{File}.bar’ }</a:t>
             </a:r>
           </a:p>
           <a:p>
@@ -9070,7 +9220,7 @@
             </a:r>
             <a:r>
               <a:rPr lang="en-US" dirty="0"/>
-              <a:t> = ‘</a:t>
+              <a:t> = ’</a:t>
             </a:r>
             <a:r>
               <a:rPr lang="en-US" dirty="0" err="1"/>
@@ -9078,7 +9228,45 @@
             </a:r>
             <a:r>
               <a:rPr lang="en-US" dirty="0"/>
-              <a:t> &lt;$SRC &gt;$DST’</a:t>
+              <a:t> &lt;{SRC} &gt;{DST}’</a:t>
+            </a:r>
+          </a:p>
+          <a:p>
+            <a:pPr marL="457200" lvl="1" indent="0">
+              <a:buFont typeface="Arial" panose="020B0604020202020204" pitchFamily="34" charset="0"/>
+              <a:buNone/>
+            </a:pPr>
+            <a:r>
+              <a:rPr lang="en-US" dirty="0" err="1"/>
+              <a:t>autodep</a:t>
+            </a:r>
+            <a:r>
+              <a:rPr lang="en-US" dirty="0"/>
+              <a:t> = ‘</a:t>
+            </a:r>
+            <a:r>
+              <a:rPr lang="en-US" dirty="0" err="1"/>
+              <a:t>ptrace</a:t>
+            </a:r>
+            <a:r>
+              <a:rPr lang="en-US" dirty="0"/>
+              <a:t>’ # or ‘none’ or ‘</a:t>
+            </a:r>
+            <a:r>
+              <a:rPr lang="en-US" dirty="0" err="1"/>
+              <a:t>ld_preload</a:t>
+            </a:r>
+            <a:r>
+              <a:rPr lang="en-US" dirty="0"/>
+              <a:t>’ or ‘</a:t>
+            </a:r>
+            <a:r>
+              <a:rPr lang="en-US" dirty="0" err="1"/>
+              <a:t>ld_audit</a:t>
+            </a:r>
+            <a:r>
+              <a:rPr lang="en-US" dirty="0"/>
+              <a:t>’</a:t>
             </a:r>
           </a:p>
           <a:p>
@@ -9108,8 +9296,12 @@
           <a:lstStyle/>
           <a:p>
             <a:r>
-              <a:rPr lang="en-US" dirty="0"/>
-              <a:t>Target flags syntax</a:t>
+              <a:rPr lang="en-US" dirty="0" err="1"/>
+              <a:t>Autodep</a:t>
+            </a:r>
+            <a:r>
+              <a:rPr lang="en-US" dirty="0"/>
+              <a:t> method</a:t>
             </a:r>
           </a:p>
         </p:txBody>
@@ -9117,7 +9309,7 @@
     </p:spTree>
     <p:extLst>
       <p:ext uri="{BB962C8B-B14F-4D97-AF65-F5344CB8AC3E}">
-        <p14:creationId xmlns:p14="http://schemas.microsoft.com/office/powerpoint/2010/main" val="1608263386"/>
+        <p14:creationId xmlns:p14="http://schemas.microsoft.com/office/powerpoint/2010/main" val="1618128373"/>
       </p:ext>
     </p:extLst>
   </p:cSld>
@@ -9146,6 +9338,132 @@
       </p:grpSpPr>
       <p:sp>
         <p:nvSpPr>
+          <p:cNvPr id="8" name="Espace réservé du contenu 7">
+            <a:extLst>
+              <a:ext uri="{FF2B5EF4-FFF2-40B4-BE49-F238E27FC236}">
+                <a16:creationId xmlns:a16="http://schemas.microsoft.com/office/drawing/2014/main" id="{A7E8E504-50C8-A9BF-67FC-E0FB31D86F6F}"/>
+              </a:ext>
+            </a:extLst>
+          </p:cNvPr>
+          <p:cNvSpPr>
+            <a:spLocks noGrp="1"/>
+          </p:cNvSpPr>
+          <p:nvPr>
+            <p:ph idx="1"/>
+          </p:nvPr>
+        </p:nvSpPr>
+        <p:spPr/>
+        <p:txBody>
+          <a:bodyPr/>
+          <a:lstStyle/>
+          <a:p>
+            <a:pPr marL="0" indent="0">
+              <a:buFont typeface="Arial" panose="020B0604020202020204" pitchFamily="34" charset="0"/>
+              <a:buNone/>
+            </a:pPr>
+            <a:r>
+              <a:rPr lang="en-US" dirty="0"/>
+              <a:t>class </a:t>
+            </a:r>
+            <a:r>
+              <a:rPr lang="en-US" dirty="0" err="1"/>
+              <a:t>MyCommand</a:t>
+            </a:r>
+            <a:r>
+              <a:rPr lang="en-US" dirty="0"/>
+              <a:t>(</a:t>
+            </a:r>
+            <a:r>
+              <a:rPr lang="en-US" dirty="0" err="1"/>
+              <a:t>lmake.Rule</a:t>
+            </a:r>
+            <a:r>
+              <a:rPr lang="en-US" dirty="0"/>
+              <a:t>) :</a:t>
+            </a:r>
+          </a:p>
+          <a:p>
+            <a:pPr marL="457200" lvl="1" indent="0">
+              <a:buFont typeface="Arial" panose="020B0604020202020204" pitchFamily="34" charset="0"/>
+              <a:buNone/>
+            </a:pPr>
+            <a:r>
+              <a:rPr lang="en-US" dirty="0"/>
+              <a:t>stems = { ’File’ : ’.*’ }</a:t>
+            </a:r>
+          </a:p>
+          <a:p>
+            <a:pPr marL="457200" lvl="1" indent="0">
+              <a:buFont typeface="Arial" panose="020B0604020202020204" pitchFamily="34" charset="0"/>
+              <a:buNone/>
+            </a:pPr>
+            <a:r>
+              <a:rPr lang="en-US" dirty="0"/>
+              <a:t>targets = { ’DST’ : ’{File}.foo’ }</a:t>
+            </a:r>
+          </a:p>
+          <a:p>
+            <a:pPr marL="457200" lvl="1" indent="0">
+              <a:buFont typeface="Arial" panose="020B0604020202020204" pitchFamily="34" charset="0"/>
+              <a:buNone/>
+            </a:pPr>
+            <a:r>
+              <a:rPr lang="en-US" dirty="0"/>
+              <a:t>deps = { ’SRC’ : ’{File}.bar’ }</a:t>
+            </a:r>
+          </a:p>
+          <a:p>
+            <a:pPr marL="457200" lvl="1" indent="0">
+              <a:buFont typeface="Arial" panose="020B0604020202020204" pitchFamily="34" charset="0"/>
+              <a:buNone/>
+            </a:pPr>
+            <a:r>
+              <a:rPr lang="en-US" dirty="0" err="1"/>
+              <a:t>cmd</a:t>
+            </a:r>
+            <a:r>
+              <a:rPr lang="en-US" dirty="0"/>
+              <a:t> = ’</a:t>
+            </a:r>
+            <a:r>
+              <a:rPr lang="en-US" dirty="0" err="1"/>
+              <a:t>my_tool</a:t>
+            </a:r>
+            <a:r>
+              <a:rPr lang="en-US" dirty="0"/>
+              <a:t> &lt;$SRC &gt;$DST’</a:t>
+            </a:r>
+          </a:p>
+          <a:p>
+            <a:pPr marL="457200" lvl="1" indent="0">
+              <a:buFont typeface="Arial" panose="020B0604020202020204" pitchFamily="34" charset="0"/>
+              <a:buNone/>
+            </a:pPr>
+            <a:r>
+              <a:rPr lang="en-US" dirty="0"/>
+              <a:t>backend = ’local’ # or </a:t>
+            </a:r>
+            <a:r>
+              <a:rPr lang="en-US" dirty="0" err="1"/>
+              <a:t>slurm</a:t>
+            </a:r>
+            <a:r>
+              <a:rPr lang="en-US" dirty="0"/>
+              <a:t> or </a:t>
+            </a:r>
+            <a:r>
+              <a:rPr lang="en-US" dirty="0" err="1"/>
+              <a:t>sge</a:t>
+            </a:r>
+            <a:endParaRPr lang="en-US" dirty="0"/>
+          </a:p>
+          <a:p>
+            <a:endParaRPr lang="en-US" dirty="0"/>
+          </a:p>
+        </p:txBody>
+      </p:sp>
+      <p:sp>
+        <p:nvSpPr>
           <p:cNvPr id="2" name="Titre 1">
             <a:extLst>
               <a:ext uri="{FF2B5EF4-FFF2-40B4-BE49-F238E27FC236}">
@@ -9167,597 +9485,15 @@
           <a:p>
             <a:r>
               <a:rPr lang="en-US" dirty="0"/>
-              <a:t>Target flags semantic</a:t>
-            </a:r>
-          </a:p>
-        </p:txBody>
-      </p:sp>
-      <p:graphicFrame>
-        <p:nvGraphicFramePr>
-          <p:cNvPr id="3" name="Tableau 3">
-            <a:extLst>
-              <a:ext uri="{FF2B5EF4-FFF2-40B4-BE49-F238E27FC236}">
-                <a16:creationId xmlns:a16="http://schemas.microsoft.com/office/drawing/2014/main" id="{ADA741C5-0945-EDB7-C1C9-415F16B9B6E7}"/>
-              </a:ext>
-            </a:extLst>
-          </p:cNvPr>
-          <p:cNvGraphicFramePr>
-            <a:graphicFrameLocks noGrp="1"/>
-          </p:cNvGraphicFramePr>
-          <p:nvPr>
-            <p:extLst>
-              <p:ext uri="{D42A27DB-BD31-4B8C-83A1-F6EECF244321}">
-                <p14:modId xmlns:p14="http://schemas.microsoft.com/office/powerpoint/2010/main" val="2463460923"/>
-              </p:ext>
-            </p:extLst>
-          </p:nvPr>
-        </p:nvGraphicFramePr>
-        <p:xfrm>
-          <a:off x="936669" y="1367155"/>
-          <a:ext cx="10423474" cy="4861560"/>
-        </p:xfrm>
-        <a:graphic>
-          <a:graphicData uri="http://schemas.openxmlformats.org/drawingml/2006/table">
-            <a:tbl>
-              <a:tblPr firstRow="1" bandRow="1">
-                <a:tableStyleId>{5C22544A-7EE6-4342-B048-85BDC9FD1C3A}</a:tableStyleId>
-              </a:tblPr>
-              <a:tblGrid>
-                <a:gridCol w="1197293">
-                  <a:extLst>
-                    <a:ext uri="{9D8B030D-6E8A-4147-A177-3AD203B41FA5}">
-                      <a16:colId xmlns:a16="http://schemas.microsoft.com/office/drawing/2014/main" val="2493287858"/>
-                    </a:ext>
-                  </a:extLst>
-                </a:gridCol>
-                <a:gridCol w="931608">
-                  <a:extLst>
-                    <a:ext uri="{9D8B030D-6E8A-4147-A177-3AD203B41FA5}">
-                      <a16:colId xmlns:a16="http://schemas.microsoft.com/office/drawing/2014/main" val="410386388"/>
-                    </a:ext>
-                  </a:extLst>
-                </a:gridCol>
-                <a:gridCol w="2112137">
-                  <a:extLst>
-                    <a:ext uri="{9D8B030D-6E8A-4147-A177-3AD203B41FA5}">
-                      <a16:colId xmlns:a16="http://schemas.microsoft.com/office/drawing/2014/main" val="1630904444"/>
-                    </a:ext>
-                  </a:extLst>
-                </a:gridCol>
-                <a:gridCol w="6182436">
-                  <a:extLst>
-                    <a:ext uri="{9D8B030D-6E8A-4147-A177-3AD203B41FA5}">
-                      <a16:colId xmlns:a16="http://schemas.microsoft.com/office/drawing/2014/main" val="1436832511"/>
-                    </a:ext>
-                  </a:extLst>
-                </a:gridCol>
-              </a:tblGrid>
-              <a:tr h="370840">
-                <a:tc>
-                  <a:txBody>
-                    <a:bodyPr/>
-                    <a:lstStyle/>
-                    <a:p>
-                      <a:pPr algn="ctr"/>
-                      <a:r>
-                        <a:rPr lang="en-US" dirty="0"/>
-                        <a:t>Flag</a:t>
-                      </a:r>
-                    </a:p>
-                  </a:txBody>
-                  <a:tcPr/>
-                </a:tc>
-                <a:tc>
-                  <a:txBody>
-                    <a:bodyPr/>
-                    <a:lstStyle/>
-                    <a:p>
-                      <a:pPr algn="ctr"/>
-                      <a:r>
-                        <a:rPr lang="en-US" dirty="0"/>
-                        <a:t>Default</a:t>
-                      </a:r>
-                    </a:p>
-                  </a:txBody>
-                  <a:tcPr/>
-                </a:tc>
-                <a:tc>
-                  <a:txBody>
-                    <a:bodyPr/>
-                    <a:lstStyle/>
-                    <a:p>
-                      <a:pPr algn="ctr"/>
-                      <a:r>
-                        <a:rPr lang="en-US" dirty="0"/>
-                        <a:t>Forced True</a:t>
-                      </a:r>
-                    </a:p>
-                  </a:txBody>
-                  <a:tcPr/>
-                </a:tc>
-                <a:tc>
-                  <a:txBody>
-                    <a:bodyPr/>
-                    <a:lstStyle/>
-                    <a:p>
-                      <a:pPr algn="ctr"/>
-                      <a:r>
-                        <a:rPr lang="en-US" dirty="0"/>
-                        <a:t>Semantic</a:t>
-                      </a:r>
-                    </a:p>
-                  </a:txBody>
-                  <a:tcPr/>
-                </a:tc>
-                <a:extLst>
-                  <a:ext uri="{0D108BD9-81ED-4DB2-BD59-A6C34878D82A}">
-                    <a16:rowId xmlns:a16="http://schemas.microsoft.com/office/drawing/2014/main" val="2350448435"/>
-                  </a:ext>
-                </a:extLst>
-              </a:tr>
-              <a:tr h="370840">
-                <a:tc>
-                  <a:txBody>
-                    <a:bodyPr/>
-                    <a:lstStyle/>
-                    <a:p>
-                      <a:r>
-                        <a:rPr lang="en-US" dirty="0"/>
-                        <a:t>Dirty</a:t>
-                      </a:r>
-                    </a:p>
-                  </a:txBody>
-                  <a:tcPr/>
-                </a:tc>
-                <a:tc>
-                  <a:txBody>
-                    <a:bodyPr/>
-                    <a:lstStyle/>
-                    <a:p>
-                      <a:r>
-                        <a:rPr lang="en-US" dirty="0"/>
-                        <a:t>False</a:t>
-                      </a:r>
-                    </a:p>
-                  </a:txBody>
-                  <a:tcPr/>
-                </a:tc>
-                <a:tc>
-                  <a:txBody>
-                    <a:bodyPr/>
-                    <a:lstStyle/>
-                    <a:p>
-                      <a:endParaRPr lang="en-US" dirty="0"/>
-                    </a:p>
-                  </a:txBody>
-                  <a:tcPr/>
-                </a:tc>
-                <a:tc>
-                  <a:txBody>
-                    <a:bodyPr/>
-                    <a:lstStyle/>
-                    <a:p>
-                      <a:pPr marL="285750" indent="-285750">
-                        <a:buFont typeface="Arial" panose="020B0604020202020204" pitchFamily="34" charset="0"/>
-                        <a:buChar char="•"/>
-                      </a:pPr>
-                      <a:r>
-                        <a:rPr lang="en-US" dirty="0"/>
-                        <a:t>File is not an official target of the rule, just write’s are allowed</a:t>
-                      </a:r>
-                    </a:p>
-                    <a:p>
-                      <a:pPr marL="285750" indent="-285750">
-                        <a:buFont typeface="Arial" panose="020B0604020202020204" pitchFamily="34" charset="0"/>
-                        <a:buChar char="•"/>
-                      </a:pPr>
-                      <a:r>
-                        <a:rPr lang="en-US" dirty="0"/>
-                        <a:t>Dirty targets are not required to mention all static stems</a:t>
-                      </a:r>
-                    </a:p>
-                  </a:txBody>
-                  <a:tcPr/>
-                </a:tc>
-                <a:extLst>
-                  <a:ext uri="{0D108BD9-81ED-4DB2-BD59-A6C34878D82A}">
-                    <a16:rowId xmlns:a16="http://schemas.microsoft.com/office/drawing/2014/main" val="1769710953"/>
-                  </a:ext>
-                </a:extLst>
-              </a:tr>
-              <a:tr h="370840">
-                <a:tc>
-                  <a:txBody>
-                    <a:bodyPr/>
-                    <a:lstStyle/>
-                    <a:p>
-                      <a:r>
-                        <a:rPr lang="en-US" dirty="0"/>
-                        <a:t>Ignore</a:t>
-                      </a:r>
-                    </a:p>
-                  </a:txBody>
-                  <a:tcPr/>
-                </a:tc>
-                <a:tc>
-                  <a:txBody>
-                    <a:bodyPr/>
-                    <a:lstStyle/>
-                    <a:p>
-                      <a:r>
-                        <a:rPr lang="en-US" dirty="0"/>
-                        <a:t>False</a:t>
-                      </a:r>
-                    </a:p>
-                  </a:txBody>
-                  <a:tcPr/>
-                </a:tc>
-                <a:tc>
-                  <a:txBody>
-                    <a:bodyPr/>
-                    <a:lstStyle/>
-                    <a:p>
-                      <a:r>
-                        <a:rPr lang="en-US" dirty="0"/>
-                        <a:t>for non-dirty targets</a:t>
-                      </a:r>
-                    </a:p>
-                  </a:txBody>
-                  <a:tcPr/>
-                </a:tc>
-                <a:tc>
-                  <a:txBody>
-                    <a:bodyPr/>
-                    <a:lstStyle/>
-                    <a:p>
-                      <a:pPr marL="285750" indent="-285750">
-                        <a:buFont typeface="Arial" panose="020B0604020202020204" pitchFamily="34" charset="0"/>
-                        <a:buChar char="•"/>
-                      </a:pPr>
-                      <a:r>
-                        <a:rPr lang="en-US" dirty="0"/>
-                        <a:t>If target is not written to, it does not become a dep</a:t>
-                      </a:r>
-                    </a:p>
-                  </a:txBody>
-                  <a:tcPr/>
-                </a:tc>
-                <a:extLst>
-                  <a:ext uri="{0D108BD9-81ED-4DB2-BD59-A6C34878D82A}">
-                    <a16:rowId xmlns:a16="http://schemas.microsoft.com/office/drawing/2014/main" val="2560131247"/>
-                  </a:ext>
-                </a:extLst>
-              </a:tr>
-              <a:tr h="370840">
-                <a:tc>
-                  <a:txBody>
-                    <a:bodyPr/>
-                    <a:lstStyle/>
-                    <a:p>
-                      <a:r>
-                        <a:rPr lang="en-US" dirty="0"/>
-                        <a:t>Read</a:t>
-                      </a:r>
-                    </a:p>
-                  </a:txBody>
-                  <a:tcPr/>
-                </a:tc>
-                <a:tc>
-                  <a:txBody>
-                    <a:bodyPr/>
-                    <a:lstStyle/>
-                    <a:p>
-                      <a:r>
-                        <a:rPr lang="en-US" dirty="0"/>
-                        <a:t>False</a:t>
-                      </a:r>
-                    </a:p>
-                  </a:txBody>
-                  <a:tcPr/>
-                </a:tc>
-                <a:tc>
-                  <a:txBody>
-                    <a:bodyPr/>
-                    <a:lstStyle/>
-                    <a:p>
-                      <a:endParaRPr lang="en-US" dirty="0"/>
-                    </a:p>
-                  </a:txBody>
-                  <a:tcPr/>
-                </a:tc>
-                <a:tc>
-                  <a:txBody>
-                    <a:bodyPr/>
-                    <a:lstStyle/>
-                    <a:p>
-                      <a:pPr marL="285750" indent="-285750">
-                        <a:buFont typeface="Arial" panose="020B0604020202020204" pitchFamily="34" charset="0"/>
-                        <a:buChar char="•"/>
-                      </a:pPr>
-                      <a:r>
-                        <a:rPr lang="en-US" dirty="0"/>
-                        <a:t>Target(s) is(are) not unlinked before job execution</a:t>
-                      </a:r>
-                    </a:p>
-                    <a:p>
-                      <a:pPr marL="285750" indent="-285750">
-                        <a:buFont typeface="Arial" panose="020B0604020202020204" pitchFamily="34" charset="0"/>
-                        <a:buChar char="•"/>
-                      </a:pPr>
-                      <a:r>
-                        <a:rPr lang="en-US" dirty="0"/>
-                        <a:t>Read before write/unlink is allowed</a:t>
-                      </a:r>
-                    </a:p>
-                  </a:txBody>
-                  <a:tcPr/>
-                </a:tc>
-                <a:extLst>
-                  <a:ext uri="{0D108BD9-81ED-4DB2-BD59-A6C34878D82A}">
-                    <a16:rowId xmlns:a16="http://schemas.microsoft.com/office/drawing/2014/main" val="1941796796"/>
-                  </a:ext>
-                </a:extLst>
-              </a:tr>
-              <a:tr h="370840">
-                <a:tc>
-                  <a:txBody>
-                    <a:bodyPr/>
-                    <a:lstStyle/>
-                    <a:p>
-                      <a:r>
-                        <a:rPr lang="en-US" dirty="0"/>
-                        <a:t>Unlink</a:t>
-                      </a:r>
-                    </a:p>
-                  </a:txBody>
-                  <a:tcPr/>
-                </a:tc>
-                <a:tc>
-                  <a:txBody>
-                    <a:bodyPr/>
-                    <a:lstStyle/>
-                    <a:p>
-                      <a:r>
-                        <a:rPr lang="en-US" dirty="0"/>
-                        <a:t>False</a:t>
-                      </a:r>
-                    </a:p>
-                  </a:txBody>
-                  <a:tcPr/>
-                </a:tc>
-                <a:tc>
-                  <a:txBody>
-                    <a:bodyPr/>
-                    <a:lstStyle/>
-                    <a:p>
-                      <a:r>
-                        <a:rPr lang="en-US" dirty="0"/>
-                        <a:t>for star targets</a:t>
-                      </a:r>
-                    </a:p>
-                  </a:txBody>
-                  <a:tcPr/>
-                </a:tc>
-                <a:tc>
-                  <a:txBody>
-                    <a:bodyPr/>
-                    <a:lstStyle/>
-                    <a:p>
-                      <a:pPr marL="285750" indent="-285750">
-                        <a:buFont typeface="Arial" panose="020B0604020202020204" pitchFamily="34" charset="0"/>
-                        <a:buChar char="•"/>
-                      </a:pPr>
-                      <a:r>
-                        <a:rPr lang="en-US" dirty="0"/>
-                        <a:t>Target is allowed not to be generated by job (else, it is an error not to generate a static target)</a:t>
-                      </a:r>
-                    </a:p>
-                  </a:txBody>
-                  <a:tcPr/>
-                </a:tc>
-                <a:extLst>
-                  <a:ext uri="{0D108BD9-81ED-4DB2-BD59-A6C34878D82A}">
-                    <a16:rowId xmlns:a16="http://schemas.microsoft.com/office/drawing/2014/main" val="3131272799"/>
-                  </a:ext>
-                </a:extLst>
-              </a:tr>
-              <a:tr h="370840">
-                <a:tc>
-                  <a:txBody>
-                    <a:bodyPr/>
-                    <a:lstStyle/>
-                    <a:p>
-                      <a:r>
-                        <a:rPr lang="en-US" dirty="0"/>
-                        <a:t>Write</a:t>
-                      </a:r>
-                    </a:p>
-                  </a:txBody>
-                  <a:tcPr/>
-                </a:tc>
-                <a:tc>
-                  <a:txBody>
-                    <a:bodyPr/>
-                    <a:lstStyle/>
-                    <a:p>
-                      <a:r>
-                        <a:rPr lang="en-US" dirty="0"/>
-                        <a:t>True</a:t>
-                      </a:r>
-                    </a:p>
-                  </a:txBody>
-                  <a:tcPr/>
-                </a:tc>
-                <a:tc>
-                  <a:txBody>
-                    <a:bodyPr/>
-                    <a:lstStyle/>
-                    <a:p>
-                      <a:endParaRPr lang="en-US" dirty="0"/>
-                    </a:p>
-                  </a:txBody>
-                  <a:tcPr/>
-                </a:tc>
-                <a:tc>
-                  <a:txBody>
-                    <a:bodyPr/>
-                    <a:lstStyle/>
-                    <a:p>
-                      <a:pPr marL="285750" indent="-285750">
-                        <a:buFont typeface="Arial" panose="020B0604020202020204" pitchFamily="34" charset="0"/>
-                        <a:buChar char="•"/>
-                      </a:pPr>
-                      <a:r>
-                        <a:rPr lang="en-US" dirty="0"/>
-                        <a:t>If target is not written to, it is considered as generated to the value it had before execution (else, it is a dep instead of a target) as soon as it is read</a:t>
-                      </a:r>
-                    </a:p>
-                  </a:txBody>
-                  <a:tcPr/>
-                </a:tc>
-                <a:extLst>
-                  <a:ext uri="{0D108BD9-81ED-4DB2-BD59-A6C34878D82A}">
-                    <a16:rowId xmlns:a16="http://schemas.microsoft.com/office/drawing/2014/main" val="3999219232"/>
-                  </a:ext>
-                </a:extLst>
-              </a:tr>
-              <a:tr h="370840">
-                <a:tc>
-                  <a:txBody>
-                    <a:bodyPr/>
-                    <a:lstStyle/>
-                    <a:p>
-                      <a:r>
-                        <a:rPr lang="en-US" dirty="0" err="1"/>
-                        <a:t>Crc</a:t>
-                      </a:r>
-                      <a:endParaRPr lang="en-US" dirty="0"/>
-                    </a:p>
-                  </a:txBody>
-                  <a:tcPr/>
-                </a:tc>
-                <a:tc>
-                  <a:txBody>
-                    <a:bodyPr/>
-                    <a:lstStyle/>
-                    <a:p>
-                      <a:r>
-                        <a:rPr lang="en-US" dirty="0"/>
-                        <a:t>True</a:t>
-                      </a:r>
-                    </a:p>
-                  </a:txBody>
-                  <a:tcPr/>
-                </a:tc>
-                <a:tc>
-                  <a:txBody>
-                    <a:bodyPr/>
-                    <a:lstStyle/>
-                    <a:p>
-                      <a:r>
-                        <a:rPr lang="en-US" dirty="0"/>
-                        <a:t>for non-dirty targets</a:t>
-                      </a:r>
-                    </a:p>
-                  </a:txBody>
-                  <a:tcPr/>
-                </a:tc>
-                <a:tc>
-                  <a:txBody>
-                    <a:bodyPr/>
-                    <a:lstStyle/>
-                    <a:p>
-                      <a:pPr marL="285750" indent="-285750">
-                        <a:buFont typeface="Arial" panose="020B0604020202020204" pitchFamily="34" charset="0"/>
-                        <a:buChar char="•"/>
-                      </a:pPr>
-                      <a:r>
-                        <a:rPr lang="en-US" dirty="0"/>
-                        <a:t>Compute a CRC for this target</a:t>
-                      </a:r>
-                    </a:p>
-                  </a:txBody>
-                  <a:tcPr/>
-                </a:tc>
-                <a:extLst>
-                  <a:ext uri="{0D108BD9-81ED-4DB2-BD59-A6C34878D82A}">
-                    <a16:rowId xmlns:a16="http://schemas.microsoft.com/office/drawing/2014/main" val="1132083452"/>
-                  </a:ext>
-                </a:extLst>
-              </a:tr>
-              <a:tr h="370840">
-                <a:tc>
-                  <a:txBody>
-                    <a:bodyPr/>
-                    <a:lstStyle/>
-                    <a:p>
-                      <a:r>
-                        <a:rPr lang="en-US" dirty="0" err="1"/>
-                        <a:t>ManualOk</a:t>
-                      </a:r>
-                      <a:endParaRPr lang="en-US" dirty="0"/>
-                    </a:p>
-                  </a:txBody>
-                  <a:tcPr/>
-                </a:tc>
-                <a:tc>
-                  <a:txBody>
-                    <a:bodyPr/>
-                    <a:lstStyle/>
-                    <a:p>
-                      <a:r>
-                        <a:rPr lang="en-US" dirty="0"/>
-                        <a:t>False</a:t>
-                      </a:r>
-                    </a:p>
-                  </a:txBody>
-                  <a:tcPr/>
-                </a:tc>
-                <a:tc>
-                  <a:txBody>
-                    <a:bodyPr/>
-                    <a:lstStyle/>
-                    <a:p>
-                      <a:endParaRPr lang="en-US" dirty="0"/>
-                    </a:p>
-                  </a:txBody>
-                  <a:tcPr/>
-                </a:tc>
-                <a:tc>
-                  <a:txBody>
-                    <a:bodyPr/>
-                    <a:lstStyle/>
-                    <a:p>
-                      <a:pPr marL="285750" indent="-285750">
-                        <a:buFont typeface="Arial" panose="020B0604020202020204" pitchFamily="34" charset="0"/>
-                        <a:buChar char="•"/>
-                      </a:pPr>
-                      <a:r>
-                        <a:rPr lang="en-US" dirty="0" err="1"/>
-                        <a:t>lmake</a:t>
-                      </a:r>
-                      <a:r>
-                        <a:rPr lang="en-US" dirty="0"/>
-                        <a:t> allows jobs to execute even if target has been modified outside its control</a:t>
-                      </a:r>
-                    </a:p>
-                  </a:txBody>
-                  <a:tcPr/>
-                </a:tc>
-                <a:extLst>
-                  <a:ext uri="{0D108BD9-81ED-4DB2-BD59-A6C34878D82A}">
-                    <a16:rowId xmlns:a16="http://schemas.microsoft.com/office/drawing/2014/main" val="1938682576"/>
-                  </a:ext>
-                </a:extLst>
-              </a:tr>
-            </a:tbl>
-          </a:graphicData>
-        </a:graphic>
-      </p:graphicFrame>
+              <a:t>Backend</a:t>
+            </a:r>
+          </a:p>
+        </p:txBody>
+      </p:sp>
     </p:spTree>
     <p:extLst>
       <p:ext uri="{BB962C8B-B14F-4D97-AF65-F5344CB8AC3E}">
-        <p14:creationId xmlns:p14="http://schemas.microsoft.com/office/powerpoint/2010/main" val="1802676249"/>
+        <p14:creationId xmlns:p14="http://schemas.microsoft.com/office/powerpoint/2010/main" val="918285568"/>
       </p:ext>
     </p:extLst>
   </p:cSld>
@@ -9802,7 +9538,9 @@
         </p:nvSpPr>
         <p:spPr/>
         <p:txBody>
-          <a:bodyPr/>
+          <a:bodyPr>
+            <a:normAutofit/>
+          </a:bodyPr>
           <a:lstStyle/>
           <a:p>
             <a:pPr marL="0" indent="0">
@@ -9837,7 +9575,7 @@
             </a:pPr>
             <a:r>
               <a:rPr lang="en-US" dirty="0"/>
-              <a:t>stems = { ‘File’ : ’.*’ }</a:t>
+              <a:t>stems = { ’File’ : ’.*’ }</a:t>
             </a:r>
           </a:p>
           <a:p>
@@ -9847,7 +9585,7 @@
             </a:pPr>
             <a:r>
               <a:rPr lang="en-US" dirty="0"/>
-              <a:t>targets = { ‘DST’ : ‘{File}.foo’ }</a:t>
+              <a:t>targets = { ’DST’ : ’{File}.foo’ }</a:t>
             </a:r>
           </a:p>
           <a:p>
@@ -9857,7 +9595,7 @@
             </a:pPr>
             <a:r>
               <a:rPr lang="en-US" dirty="0"/>
-              <a:t>deps = { ‘SRC’ : ‘{File}.bar’ }</a:t>
+              <a:t>deps = { ’SRC’ : ’{File}.bar’ }</a:t>
             </a:r>
           </a:p>
           <a:p>
@@ -9871,7 +9609,7 @@
             </a:r>
             <a:r>
               <a:rPr lang="en-US" dirty="0"/>
-              <a:t> = ‘</a:t>
+              <a:t> = ’</a:t>
             </a:r>
             <a:r>
               <a:rPr lang="en-US" dirty="0" err="1"/>
@@ -9879,7 +9617,7 @@
             </a:r>
             <a:r>
               <a:rPr lang="en-US" dirty="0"/>
-              <a:t> &lt;$SRC &gt;$DST’</a:t>
+              <a:t> &lt;{SRC} &gt;{DST}’</a:t>
             </a:r>
           </a:p>
           <a:p>
@@ -9888,40 +9626,22 @@
               <a:buNone/>
             </a:pPr>
             <a:r>
-              <a:rPr lang="en-US" dirty="0" err="1"/>
-              <a:t>autodep</a:t>
-            </a:r>
-            <a:r>
-              <a:rPr lang="en-US" dirty="0"/>
-              <a:t> = ‘</a:t>
-            </a:r>
-            <a:r>
-              <a:rPr lang="en-US" dirty="0" err="1"/>
-              <a:t>ptrace</a:t>
-            </a:r>
-            <a:r>
-              <a:rPr lang="en-US" dirty="0"/>
-              <a:t>’ # or ‘none’ or ‘</a:t>
-            </a:r>
-            <a:r>
-              <a:rPr lang="en-US" dirty="0" err="1"/>
-              <a:t>ld_preload</a:t>
-            </a:r>
-            <a:r>
-              <a:rPr lang="en-US" dirty="0"/>
-              <a:t>’ or ‘</a:t>
-            </a:r>
-            <a:r>
-              <a:rPr lang="en-US" dirty="0" err="1"/>
-              <a:t>ld_audit</a:t>
-            </a:r>
-            <a:r>
-              <a:rPr lang="en-US" dirty="0"/>
-              <a:t>’</a:t>
-            </a:r>
-          </a:p>
-          <a:p>
-            <a:endParaRPr lang="en-US" dirty="0"/>
+              <a:rPr lang="en-US" dirty="0"/>
+              <a:t>resources = {’cpu’:2}</a:t>
+            </a:r>
+          </a:p>
+          <a:p>
+            <a:r>
+              <a:rPr lang="en-US" dirty="0"/>
+              <a:t>resources attribute has the same syntax as deps</a:t>
+            </a:r>
+          </a:p>
+          <a:p>
+            <a:pPr lvl="1"/>
+            <a:r>
+              <a:rPr lang="en-US" dirty="0"/>
+              <a:t>except they are converted to str using str(value) if they are not already str</a:t>
+            </a:r>
           </a:p>
         </p:txBody>
       </p:sp>
@@ -9947,12 +9667,8 @@
           <a:lstStyle/>
           <a:p>
             <a:r>
-              <a:rPr lang="en-US" dirty="0" err="1"/>
-              <a:t>Autodep</a:t>
-            </a:r>
-            <a:r>
-              <a:rPr lang="en-US" dirty="0"/>
-              <a:t> method</a:t>
+              <a:rPr lang="en-US" dirty="0"/>
+              <a:t>resources syntax</a:t>
             </a:r>
           </a:p>
         </p:txBody>
@@ -9960,7 +9676,7 @@
     </p:spTree>
     <p:extLst>
       <p:ext uri="{BB962C8B-B14F-4D97-AF65-F5344CB8AC3E}">
-        <p14:creationId xmlns:p14="http://schemas.microsoft.com/office/powerpoint/2010/main" val="1618128373"/>
+        <p14:creationId xmlns:p14="http://schemas.microsoft.com/office/powerpoint/2010/main" val="241159449"/>
       </p:ext>
     </p:extLst>
   </p:cSld>
@@ -10008,95 +9724,16 @@
           <a:bodyPr/>
           <a:lstStyle/>
           <a:p>
-            <a:pPr marL="0" indent="0">
-              <a:buFont typeface="Arial" panose="020B0604020202020204" pitchFamily="34" charset="0"/>
-              <a:buNone/>
-            </a:pPr>
-            <a:r>
-              <a:rPr lang="en-US" dirty="0"/>
-              <a:t>class </a:t>
-            </a:r>
-            <a:r>
-              <a:rPr lang="en-US" dirty="0" err="1"/>
-              <a:t>MyCommand</a:t>
-            </a:r>
-            <a:r>
-              <a:rPr lang="en-US" dirty="0"/>
-              <a:t>(</a:t>
-            </a:r>
-            <a:r>
-              <a:rPr lang="en-US" dirty="0" err="1"/>
-              <a:t>lmake.Rule</a:t>
-            </a:r>
-            <a:r>
-              <a:rPr lang="en-US" dirty="0"/>
-              <a:t>) :</a:t>
-            </a:r>
-          </a:p>
-          <a:p>
-            <a:pPr marL="457200" lvl="1" indent="0">
-              <a:buFont typeface="Arial" panose="020B0604020202020204" pitchFamily="34" charset="0"/>
-              <a:buNone/>
-            </a:pPr>
-            <a:r>
-              <a:rPr lang="en-US" dirty="0"/>
-              <a:t>stems = { ‘File’ : ’.*’ }</a:t>
-            </a:r>
-          </a:p>
-          <a:p>
-            <a:pPr marL="457200" lvl="1" indent="0">
-              <a:buFont typeface="Arial" panose="020B0604020202020204" pitchFamily="34" charset="0"/>
-              <a:buNone/>
-            </a:pPr>
-            <a:r>
-              <a:rPr lang="en-US" dirty="0"/>
-              <a:t>targets = { ‘DST’ : ‘{File}.foo’ }</a:t>
-            </a:r>
-          </a:p>
-          <a:p>
-            <a:pPr marL="457200" lvl="1" indent="0">
-              <a:buFont typeface="Arial" panose="020B0604020202020204" pitchFamily="34" charset="0"/>
-              <a:buNone/>
-            </a:pPr>
-            <a:r>
-              <a:rPr lang="en-US" dirty="0"/>
-              <a:t>deps = { ‘SRC’ : ‘{File}.bar’ }</a:t>
-            </a:r>
-          </a:p>
-          <a:p>
-            <a:pPr marL="457200" lvl="1" indent="0">
-              <a:buFont typeface="Arial" panose="020B0604020202020204" pitchFamily="34" charset="0"/>
-              <a:buNone/>
-            </a:pPr>
-            <a:r>
-              <a:rPr lang="en-US" dirty="0" err="1"/>
-              <a:t>cmd</a:t>
-            </a:r>
-            <a:r>
-              <a:rPr lang="en-US" dirty="0"/>
-              <a:t> = ‘</a:t>
-            </a:r>
-            <a:r>
-              <a:rPr lang="en-US" dirty="0" err="1"/>
-              <a:t>my_tool</a:t>
-            </a:r>
-            <a:r>
-              <a:rPr lang="en-US" dirty="0"/>
-              <a:t> &lt;$SRC &gt;$DST’</a:t>
-            </a:r>
-          </a:p>
-          <a:p>
-            <a:pPr marL="457200" lvl="1" indent="0">
-              <a:buFont typeface="Arial" panose="020B0604020202020204" pitchFamily="34" charset="0"/>
-              <a:buNone/>
-            </a:pPr>
-            <a:r>
-              <a:rPr lang="en-US" dirty="0"/>
-              <a:t>backend = ‘local’ # for now the only possibility</a:t>
-            </a:r>
-          </a:p>
-          <a:p>
-            <a:endParaRPr lang="en-US" dirty="0"/>
+            <a:r>
+              <a:rPr lang="en-US" dirty="0"/>
+              <a:t>resources are passed to backend for interpretation</a:t>
+            </a:r>
+          </a:p>
+          <a:p>
+            <a:r>
+              <a:rPr lang="en-US" dirty="0"/>
+              <a:t>Local backend interpret them as resources to be reserved in the pool passed in config</a:t>
+            </a:r>
           </a:p>
         </p:txBody>
       </p:sp>
@@ -10123,7 +9760,7 @@
           <a:p>
             <a:r>
               <a:rPr lang="en-US" dirty="0"/>
-              <a:t>Backend</a:t>
+              <a:t>resources semantic</a:t>
             </a:r>
           </a:p>
         </p:txBody>
@@ -10131,7 +9768,7 @@
     </p:spTree>
     <p:extLst>
       <p:ext uri="{BB962C8B-B14F-4D97-AF65-F5344CB8AC3E}">
-        <p14:creationId xmlns:p14="http://schemas.microsoft.com/office/powerpoint/2010/main" val="918285568"/>
+        <p14:creationId xmlns:p14="http://schemas.microsoft.com/office/powerpoint/2010/main" val="851766604"/>
       </p:ext>
     </p:extLst>
   </p:cSld>
@@ -10174,145 +9811,319 @@
             <p:ph idx="1"/>
           </p:nvPr>
         </p:nvSpPr>
+        <p:spPr>
+          <a:xfrm>
+            <a:off x="838200" y="1825625"/>
+            <a:ext cx="10515600" cy="1481246"/>
+          </a:xfrm>
+        </p:spPr>
+        <p:txBody>
+          <a:bodyPr/>
+          <a:lstStyle/>
+          <a:p>
+            <a:pPr marL="0" indent="0">
+              <a:buFont typeface="Arial" panose="020B0604020202020204" pitchFamily="34" charset="0"/>
+              <a:buNone/>
+            </a:pPr>
+            <a:r>
+              <a:rPr lang="en-US" dirty="0"/>
+              <a:t>class </a:t>
+            </a:r>
+            <a:r>
+              <a:rPr lang="en-US" dirty="0" err="1"/>
+              <a:t>MyAntiRule</a:t>
+            </a:r>
+            <a:r>
+              <a:rPr lang="en-US" dirty="0"/>
+              <a:t>(</a:t>
+            </a:r>
+            <a:r>
+              <a:rPr lang="en-US" dirty="0" err="1"/>
+              <a:t>lmake.AntiRule</a:t>
+            </a:r>
+            <a:r>
+              <a:rPr lang="en-US" dirty="0"/>
+              <a:t>) :</a:t>
+            </a:r>
+          </a:p>
+          <a:p>
+            <a:pPr marL="457200" lvl="1" indent="0">
+              <a:buFont typeface="Arial" panose="020B0604020202020204" pitchFamily="34" charset="0"/>
+              <a:buNone/>
+            </a:pPr>
+            <a:r>
+              <a:rPr lang="en-US" dirty="0"/>
+              <a:t>stems = { ’File’ : ’.*’ }</a:t>
+            </a:r>
+          </a:p>
+          <a:p>
+            <a:pPr marL="457200" lvl="1" indent="0">
+              <a:buFont typeface="Arial" panose="020B0604020202020204" pitchFamily="34" charset="0"/>
+              <a:buNone/>
+            </a:pPr>
+            <a:r>
+              <a:rPr lang="en-US" dirty="0"/>
+              <a:t>targets = { ’DST’ : ’{File}.foo’ }</a:t>
+            </a:r>
+          </a:p>
+        </p:txBody>
+      </p:sp>
+      <p:sp>
+        <p:nvSpPr>
+          <p:cNvPr id="2" name="Titre 1">
+            <a:extLst>
+              <a:ext uri="{FF2B5EF4-FFF2-40B4-BE49-F238E27FC236}">
+                <a16:creationId xmlns:a16="http://schemas.microsoft.com/office/drawing/2014/main" id="{4A05D434-ED4E-1367-0603-31E95C2B623B}"/>
+              </a:ext>
+            </a:extLst>
+          </p:cNvPr>
+          <p:cNvSpPr>
+            <a:spLocks noGrp="1"/>
+          </p:cNvSpPr>
+          <p:nvPr>
+            <p:ph type="title"/>
+          </p:nvPr>
+        </p:nvSpPr>
         <p:spPr/>
         <p:txBody>
           <a:bodyPr/>
           <a:lstStyle/>
           <a:p>
-            <a:pPr marL="0" indent="0">
-              <a:buFont typeface="Arial" panose="020B0604020202020204" pitchFamily="34" charset="0"/>
-              <a:buNone/>
-            </a:pPr>
-            <a:r>
-              <a:rPr lang="en-US" dirty="0"/>
-              <a:t>class </a:t>
+            <a:r>
+              <a:rPr lang="en-US" dirty="0"/>
+              <a:t>anti-rules</a:t>
+            </a:r>
+          </a:p>
+        </p:txBody>
+      </p:sp>
+      <p:sp>
+        <p:nvSpPr>
+          <p:cNvPr id="3" name="Espace réservé du contenu 7">
+            <a:extLst>
+              <a:ext uri="{FF2B5EF4-FFF2-40B4-BE49-F238E27FC236}">
+                <a16:creationId xmlns:a16="http://schemas.microsoft.com/office/drawing/2014/main" id="{94B4E811-FA5A-FD44-CD42-6B828C90D802}"/>
+              </a:ext>
+            </a:extLst>
+          </p:cNvPr>
+          <p:cNvSpPr txBox="1">
+            <a:spLocks/>
+          </p:cNvSpPr>
+          <p:nvPr/>
+        </p:nvSpPr>
+        <p:spPr>
+          <a:xfrm>
+            <a:off x="838200" y="3427912"/>
+            <a:ext cx="10515600" cy="2960361"/>
+          </a:xfrm>
+          <a:prstGeom prst="rect">
+            <a:avLst/>
+          </a:prstGeom>
+        </p:spPr>
+        <p:txBody>
+          <a:bodyPr vert="horz" lIns="91440" tIns="45720" rIns="91440" bIns="45720" rtlCol="0">
+            <a:normAutofit/>
+          </a:bodyPr>
+          <a:lstStyle>
+            <a:lvl1pPr marL="228600" indent="-228600" algn="l" defTabSz="914400" rtl="0" eaLnBrk="1" latinLnBrk="0" hangingPunct="1">
+              <a:lnSpc>
+                <a:spcPct val="90000"/>
+              </a:lnSpc>
+              <a:spcBef>
+                <a:spcPts val="1000"/>
+              </a:spcBef>
+              <a:buFont typeface="Arial" panose="020B0604020202020204" pitchFamily="34" charset="0"/>
+              <a:buChar char="•"/>
+              <a:defRPr sz="2800" kern="1200">
+                <a:solidFill>
+                  <a:schemeClr val="tx1"/>
+                </a:solidFill>
+                <a:latin typeface="+mn-lt"/>
+                <a:ea typeface="+mn-ea"/>
+                <a:cs typeface="+mn-cs"/>
+              </a:defRPr>
+            </a:lvl1pPr>
+            <a:lvl2pPr marL="685800" indent="-228600" algn="l" defTabSz="914400" rtl="0" eaLnBrk="1" latinLnBrk="0" hangingPunct="1">
+              <a:lnSpc>
+                <a:spcPct val="90000"/>
+              </a:lnSpc>
+              <a:spcBef>
+                <a:spcPts val="500"/>
+              </a:spcBef>
+              <a:buFont typeface="Arial" panose="020B0604020202020204" pitchFamily="34" charset="0"/>
+              <a:buChar char="•"/>
+              <a:defRPr sz="2400" kern="1200">
+                <a:solidFill>
+                  <a:schemeClr val="tx1"/>
+                </a:solidFill>
+                <a:latin typeface="+mn-lt"/>
+                <a:ea typeface="+mn-ea"/>
+                <a:cs typeface="+mn-cs"/>
+              </a:defRPr>
+            </a:lvl2pPr>
+            <a:lvl3pPr marL="1143000" indent="-228600" algn="l" defTabSz="914400" rtl="0" eaLnBrk="1" latinLnBrk="0" hangingPunct="1">
+              <a:lnSpc>
+                <a:spcPct val="90000"/>
+              </a:lnSpc>
+              <a:spcBef>
+                <a:spcPts val="500"/>
+              </a:spcBef>
+              <a:buFont typeface="Arial" panose="020B0604020202020204" pitchFamily="34" charset="0"/>
+              <a:buChar char="•"/>
+              <a:defRPr sz="2000" kern="1200">
+                <a:solidFill>
+                  <a:schemeClr val="tx1"/>
+                </a:solidFill>
+                <a:latin typeface="+mn-lt"/>
+                <a:ea typeface="+mn-ea"/>
+                <a:cs typeface="+mn-cs"/>
+              </a:defRPr>
+            </a:lvl3pPr>
+            <a:lvl4pPr marL="1600200" indent="-228600" algn="l" defTabSz="914400" rtl="0" eaLnBrk="1" latinLnBrk="0" hangingPunct="1">
+              <a:lnSpc>
+                <a:spcPct val="90000"/>
+              </a:lnSpc>
+              <a:spcBef>
+                <a:spcPts val="500"/>
+              </a:spcBef>
+              <a:buFont typeface="Arial" panose="020B0604020202020204" pitchFamily="34" charset="0"/>
+              <a:buChar char="•"/>
+              <a:defRPr sz="1800" kern="1200">
+                <a:solidFill>
+                  <a:schemeClr val="tx1"/>
+                </a:solidFill>
+                <a:latin typeface="+mn-lt"/>
+                <a:ea typeface="+mn-ea"/>
+                <a:cs typeface="+mn-cs"/>
+              </a:defRPr>
+            </a:lvl4pPr>
+            <a:lvl5pPr marL="2057400" indent="-228600" algn="l" defTabSz="914400" rtl="0" eaLnBrk="1" latinLnBrk="0" hangingPunct="1">
+              <a:lnSpc>
+                <a:spcPct val="90000"/>
+              </a:lnSpc>
+              <a:spcBef>
+                <a:spcPts val="500"/>
+              </a:spcBef>
+              <a:buFont typeface="Arial" panose="020B0604020202020204" pitchFamily="34" charset="0"/>
+              <a:buChar char="•"/>
+              <a:defRPr sz="1800" kern="1200">
+                <a:solidFill>
+                  <a:schemeClr val="tx1"/>
+                </a:solidFill>
+                <a:latin typeface="+mn-lt"/>
+                <a:ea typeface="+mn-ea"/>
+                <a:cs typeface="+mn-cs"/>
+              </a:defRPr>
+            </a:lvl5pPr>
+            <a:lvl6pPr marL="2514600" indent="-228600" algn="l" defTabSz="914400" rtl="0" eaLnBrk="1" latinLnBrk="0" hangingPunct="1">
+              <a:lnSpc>
+                <a:spcPct val="90000"/>
+              </a:lnSpc>
+              <a:spcBef>
+                <a:spcPts val="500"/>
+              </a:spcBef>
+              <a:buFont typeface="Arial" panose="020B0604020202020204" pitchFamily="34" charset="0"/>
+              <a:buChar char="•"/>
+              <a:defRPr sz="1800" kern="1200">
+                <a:solidFill>
+                  <a:schemeClr val="tx1"/>
+                </a:solidFill>
+                <a:latin typeface="+mn-lt"/>
+                <a:ea typeface="+mn-ea"/>
+                <a:cs typeface="+mn-cs"/>
+              </a:defRPr>
+            </a:lvl6pPr>
+            <a:lvl7pPr marL="2971800" indent="-228600" algn="l" defTabSz="914400" rtl="0" eaLnBrk="1" latinLnBrk="0" hangingPunct="1">
+              <a:lnSpc>
+                <a:spcPct val="90000"/>
+              </a:lnSpc>
+              <a:spcBef>
+                <a:spcPts val="500"/>
+              </a:spcBef>
+              <a:buFont typeface="Arial" panose="020B0604020202020204" pitchFamily="34" charset="0"/>
+              <a:buChar char="•"/>
+              <a:defRPr sz="1800" kern="1200">
+                <a:solidFill>
+                  <a:schemeClr val="tx1"/>
+                </a:solidFill>
+                <a:latin typeface="+mn-lt"/>
+                <a:ea typeface="+mn-ea"/>
+                <a:cs typeface="+mn-cs"/>
+              </a:defRPr>
+            </a:lvl7pPr>
+            <a:lvl8pPr marL="3429000" indent="-228600" algn="l" defTabSz="914400" rtl="0" eaLnBrk="1" latinLnBrk="0" hangingPunct="1">
+              <a:lnSpc>
+                <a:spcPct val="90000"/>
+              </a:lnSpc>
+              <a:spcBef>
+                <a:spcPts val="500"/>
+              </a:spcBef>
+              <a:buFont typeface="Arial" panose="020B0604020202020204" pitchFamily="34" charset="0"/>
+              <a:buChar char="•"/>
+              <a:defRPr sz="1800" kern="1200">
+                <a:solidFill>
+                  <a:schemeClr val="tx1"/>
+                </a:solidFill>
+                <a:latin typeface="+mn-lt"/>
+                <a:ea typeface="+mn-ea"/>
+                <a:cs typeface="+mn-cs"/>
+              </a:defRPr>
+            </a:lvl8pPr>
+            <a:lvl9pPr marL="3886200" indent="-228600" algn="l" defTabSz="914400" rtl="0" eaLnBrk="1" latinLnBrk="0" hangingPunct="1">
+              <a:lnSpc>
+                <a:spcPct val="90000"/>
+              </a:lnSpc>
+              <a:spcBef>
+                <a:spcPts val="500"/>
+              </a:spcBef>
+              <a:buFont typeface="Arial" panose="020B0604020202020204" pitchFamily="34" charset="0"/>
+              <a:buChar char="•"/>
+              <a:defRPr sz="1800" kern="1200">
+                <a:solidFill>
+                  <a:schemeClr val="tx1"/>
+                </a:solidFill>
+                <a:latin typeface="+mn-lt"/>
+                <a:ea typeface="+mn-ea"/>
+                <a:cs typeface="+mn-cs"/>
+              </a:defRPr>
+            </a:lvl9pPr>
+          </a:lstStyle>
+          <a:p>
+            <a:r>
+              <a:rPr lang="en-US" dirty="0"/>
+              <a:t>Anti-rules are used to mentioned that some targets cannot be selected by other rules</a:t>
+            </a:r>
+          </a:p>
+          <a:p>
+            <a:r>
+              <a:rPr lang="en-US" dirty="0"/>
+              <a:t>Used to avoid infinite recursions in situations like :</a:t>
+            </a:r>
+          </a:p>
+          <a:p>
+            <a:pPr lvl="1"/>
+            <a:r>
+              <a:rPr lang="en-US" dirty="0"/>
+              <a:t>generate {File} from {File}.c</a:t>
+            </a:r>
+          </a:p>
+          <a:p>
+            <a:pPr lvl="1"/>
+            <a:r>
+              <a:rPr lang="en-US" dirty="0"/>
+              <a:t>set anti-rule for {File}.</a:t>
             </a:r>
             <a:r>
               <a:rPr lang="en-US" dirty="0" err="1"/>
-              <a:t>MyCommand</a:t>
-            </a:r>
-            <a:r>
-              <a:rPr lang="en-US" dirty="0"/>
-              <a:t>(</a:t>
-            </a:r>
-            <a:r>
-              <a:rPr lang="en-US" dirty="0" err="1"/>
-              <a:t>lmake.Rule</a:t>
-            </a:r>
-            <a:r>
-              <a:rPr lang="en-US" dirty="0"/>
-              <a:t>) :</a:t>
-            </a:r>
-          </a:p>
-          <a:p>
-            <a:pPr marL="457200" lvl="1" indent="0">
-              <a:buFont typeface="Arial" panose="020B0604020202020204" pitchFamily="34" charset="0"/>
-              <a:buNone/>
-            </a:pPr>
-            <a:r>
-              <a:rPr lang="en-US" dirty="0"/>
-              <a:t>stems = { ‘File’ : ’.*’ }</a:t>
-            </a:r>
-          </a:p>
-          <a:p>
-            <a:pPr marL="457200" lvl="1" indent="0">
-              <a:buFont typeface="Arial" panose="020B0604020202020204" pitchFamily="34" charset="0"/>
-              <a:buNone/>
-            </a:pPr>
-            <a:r>
-              <a:rPr lang="en-US" dirty="0"/>
-              <a:t>targets = { ‘DST’ : ‘{File}.foo’ }</a:t>
-            </a:r>
-          </a:p>
-          <a:p>
-            <a:pPr marL="457200" lvl="1" indent="0">
-              <a:buFont typeface="Arial" panose="020B0604020202020204" pitchFamily="34" charset="0"/>
-              <a:buNone/>
-            </a:pPr>
-            <a:r>
-              <a:rPr lang="en-US" dirty="0"/>
-              <a:t>deps = { ‘SRC’ : ‘{File}.bar’ }</a:t>
-            </a:r>
-          </a:p>
-          <a:p>
-            <a:pPr marL="457200" lvl="1" indent="0">
-              <a:buFont typeface="Arial" panose="020B0604020202020204" pitchFamily="34" charset="0"/>
-              <a:buNone/>
-            </a:pPr>
-            <a:r>
-              <a:rPr lang="en-US" dirty="0" err="1"/>
-              <a:t>cmd</a:t>
-            </a:r>
-            <a:r>
-              <a:rPr lang="en-US" dirty="0"/>
-              <a:t> = ‘</a:t>
-            </a:r>
-            <a:r>
-              <a:rPr lang="en-US" dirty="0" err="1"/>
-              <a:t>my_tool</a:t>
-            </a:r>
-            <a:r>
-              <a:rPr lang="en-US" dirty="0"/>
-              <a:t> &lt;$SRC &gt;$DST’</a:t>
-            </a:r>
-          </a:p>
-          <a:p>
-            <a:pPr marL="457200" lvl="1" indent="0">
-              <a:buFont typeface="Arial" panose="020B0604020202020204" pitchFamily="34" charset="0"/>
-              <a:buNone/>
-            </a:pPr>
-            <a:r>
-              <a:rPr lang="en-US" dirty="0"/>
-              <a:t>resources = {‘cpu’:2}</a:t>
-            </a:r>
-          </a:p>
-          <a:p>
-            <a:r>
-              <a:rPr lang="en-US" dirty="0"/>
-              <a:t>resources attribute has the same syntax as deps</a:t>
-            </a:r>
-          </a:p>
-          <a:p>
-            <a:pPr lvl="1"/>
-            <a:r>
-              <a:rPr lang="en-US" dirty="0"/>
-              <a:t>except they are converted to str using str(value) if they are not already str</a:t>
-            </a:r>
-          </a:p>
-        </p:txBody>
-      </p:sp>
-      <p:sp>
-        <p:nvSpPr>
-          <p:cNvPr id="2" name="Titre 1">
-            <a:extLst>
-              <a:ext uri="{FF2B5EF4-FFF2-40B4-BE49-F238E27FC236}">
-                <a16:creationId xmlns:a16="http://schemas.microsoft.com/office/drawing/2014/main" id="{4A05D434-ED4E-1367-0603-31E95C2B623B}"/>
-              </a:ext>
-            </a:extLst>
-          </p:cNvPr>
-          <p:cNvSpPr>
-            <a:spLocks noGrp="1"/>
-          </p:cNvSpPr>
-          <p:nvPr>
-            <p:ph type="title"/>
-          </p:nvPr>
-        </p:nvSpPr>
-        <p:spPr/>
-        <p:txBody>
-          <a:bodyPr/>
-          <a:lstStyle/>
-          <a:p>
-            <a:r>
-              <a:rPr lang="en-US" dirty="0"/>
-              <a:t>resources syntax</a:t>
-            </a:r>
+              <a:t>c.c</a:t>
+            </a:r>
+            <a:endParaRPr lang="en-US" dirty="0"/>
           </a:p>
         </p:txBody>
       </p:sp>
     </p:spTree>
     <p:extLst>
       <p:ext uri="{BB962C8B-B14F-4D97-AF65-F5344CB8AC3E}">
-        <p14:creationId xmlns:p14="http://schemas.microsoft.com/office/powerpoint/2010/main" val="241159449"/>
+        <p14:creationId xmlns:p14="http://schemas.microsoft.com/office/powerpoint/2010/main" val="1732704744"/>
       </p:ext>
     </p:extLst>
   </p:cSld>
@@ -10355,48 +10166,285 @@
             <p:ph idx="1"/>
           </p:nvPr>
         </p:nvSpPr>
+        <p:spPr>
+          <a:xfrm>
+            <a:off x="838200" y="1825625"/>
+            <a:ext cx="10515600" cy="955153"/>
+          </a:xfrm>
+        </p:spPr>
+        <p:txBody>
+          <a:bodyPr/>
+          <a:lstStyle/>
+          <a:p>
+            <a:pPr marL="0" indent="0">
+              <a:buFont typeface="Arial" panose="020B0604020202020204" pitchFamily="34" charset="0"/>
+              <a:buNone/>
+            </a:pPr>
+            <a:r>
+              <a:rPr lang="en-US" dirty="0"/>
+              <a:t>class </a:t>
+            </a:r>
+            <a:r>
+              <a:rPr lang="en-US" dirty="0" err="1"/>
+              <a:t>MyCommand</a:t>
+            </a:r>
+            <a:r>
+              <a:rPr lang="en-US" dirty="0"/>
+              <a:t>(</a:t>
+            </a:r>
+            <a:r>
+              <a:rPr lang="en-US" dirty="0" err="1"/>
+              <a:t>lmake.PyRule</a:t>
+            </a:r>
+            <a:r>
+              <a:rPr lang="en-US" dirty="0"/>
+              <a:t>) :</a:t>
+            </a:r>
+          </a:p>
+          <a:p>
+            <a:pPr marL="457200" lvl="1" indent="0">
+              <a:buFont typeface="Arial" panose="020B0604020202020204" pitchFamily="34" charset="0"/>
+              <a:buNone/>
+            </a:pPr>
+            <a:r>
+              <a:rPr lang="en-US" dirty="0"/>
+              <a:t>…</a:t>
+            </a:r>
+          </a:p>
+        </p:txBody>
+      </p:sp>
+      <p:sp>
+        <p:nvSpPr>
+          <p:cNvPr id="2" name="Titre 1">
+            <a:extLst>
+              <a:ext uri="{FF2B5EF4-FFF2-40B4-BE49-F238E27FC236}">
+                <a16:creationId xmlns:a16="http://schemas.microsoft.com/office/drawing/2014/main" id="{4A05D434-ED4E-1367-0603-31E95C2B623B}"/>
+              </a:ext>
+            </a:extLst>
+          </p:cNvPr>
+          <p:cNvSpPr>
+            <a:spLocks noGrp="1"/>
+          </p:cNvSpPr>
+          <p:nvPr>
+            <p:ph type="title"/>
+          </p:nvPr>
+        </p:nvSpPr>
         <p:spPr/>
         <p:txBody>
           <a:bodyPr/>
           <a:lstStyle/>
           <a:p>
             <a:r>
-              <a:rPr lang="en-US" dirty="0"/>
-              <a:t>resources are passed to backend for interpretation</a:t>
-            </a:r>
-          </a:p>
-          <a:p>
-            <a:r>
-              <a:rPr lang="en-US" dirty="0"/>
-              <a:t>Local backend interpret them as resources to be reserved in the pool passed in config</a:t>
-            </a:r>
-          </a:p>
-        </p:txBody>
-      </p:sp>
-      <p:sp>
-        <p:nvSpPr>
-          <p:cNvPr id="2" name="Titre 1">
-            <a:extLst>
-              <a:ext uri="{FF2B5EF4-FFF2-40B4-BE49-F238E27FC236}">
-                <a16:creationId xmlns:a16="http://schemas.microsoft.com/office/drawing/2014/main" id="{4A05D434-ED4E-1367-0603-31E95C2B623B}"/>
-              </a:ext>
-            </a:extLst>
-          </p:cNvPr>
-          <p:cNvSpPr>
-            <a:spLocks noGrp="1"/>
-          </p:cNvSpPr>
-          <p:nvPr>
-            <p:ph type="title"/>
-          </p:nvPr>
-        </p:nvSpPr>
-        <p:spPr/>
-        <p:txBody>
-          <a:bodyPr/>
-          <a:lstStyle/>
-          <a:p>
-            <a:r>
-              <a:rPr lang="en-US" dirty="0"/>
-              <a:t>resources semantic</a:t>
+              <a:rPr lang="en-US" dirty="0" err="1"/>
+              <a:t>PyRule</a:t>
+            </a:r>
+            <a:endParaRPr lang="en-US" dirty="0"/>
+          </a:p>
+        </p:txBody>
+      </p:sp>
+      <p:sp>
+        <p:nvSpPr>
+          <p:cNvPr id="3" name="Espace réservé du contenu 7">
+            <a:extLst>
+              <a:ext uri="{FF2B5EF4-FFF2-40B4-BE49-F238E27FC236}">
+                <a16:creationId xmlns:a16="http://schemas.microsoft.com/office/drawing/2014/main" id="{94B4E811-FA5A-FD44-CD42-6B828C90D802}"/>
+              </a:ext>
+            </a:extLst>
+          </p:cNvPr>
+          <p:cNvSpPr txBox="1">
+            <a:spLocks/>
+          </p:cNvSpPr>
+          <p:nvPr/>
+        </p:nvSpPr>
+        <p:spPr>
+          <a:xfrm>
+            <a:off x="838200" y="2780778"/>
+            <a:ext cx="10515600" cy="3607495"/>
+          </a:xfrm>
+          <a:prstGeom prst="rect">
+            <a:avLst/>
+          </a:prstGeom>
+        </p:spPr>
+        <p:txBody>
+          <a:bodyPr vert="horz" lIns="91440" tIns="45720" rIns="91440" bIns="45720" rtlCol="0">
+            <a:normAutofit/>
+          </a:bodyPr>
+          <a:lstStyle>
+            <a:lvl1pPr marL="228600" indent="-228600" algn="l" defTabSz="914400" rtl="0" eaLnBrk="1" latinLnBrk="0" hangingPunct="1">
+              <a:lnSpc>
+                <a:spcPct val="90000"/>
+              </a:lnSpc>
+              <a:spcBef>
+                <a:spcPts val="1000"/>
+              </a:spcBef>
+              <a:buFont typeface="Arial" panose="020B0604020202020204" pitchFamily="34" charset="0"/>
+              <a:buChar char="•"/>
+              <a:defRPr sz="2800" kern="1200">
+                <a:solidFill>
+                  <a:schemeClr val="tx1"/>
+                </a:solidFill>
+                <a:latin typeface="+mn-lt"/>
+                <a:ea typeface="+mn-ea"/>
+                <a:cs typeface="+mn-cs"/>
+              </a:defRPr>
+            </a:lvl1pPr>
+            <a:lvl2pPr marL="685800" indent="-228600" algn="l" defTabSz="914400" rtl="0" eaLnBrk="1" latinLnBrk="0" hangingPunct="1">
+              <a:lnSpc>
+                <a:spcPct val="90000"/>
+              </a:lnSpc>
+              <a:spcBef>
+                <a:spcPts val="500"/>
+              </a:spcBef>
+              <a:buFont typeface="Arial" panose="020B0604020202020204" pitchFamily="34" charset="0"/>
+              <a:buChar char="•"/>
+              <a:defRPr sz="2400" kern="1200">
+                <a:solidFill>
+                  <a:schemeClr val="tx1"/>
+                </a:solidFill>
+                <a:latin typeface="+mn-lt"/>
+                <a:ea typeface="+mn-ea"/>
+                <a:cs typeface="+mn-cs"/>
+              </a:defRPr>
+            </a:lvl2pPr>
+            <a:lvl3pPr marL="1143000" indent="-228600" algn="l" defTabSz="914400" rtl="0" eaLnBrk="1" latinLnBrk="0" hangingPunct="1">
+              <a:lnSpc>
+                <a:spcPct val="90000"/>
+              </a:lnSpc>
+              <a:spcBef>
+                <a:spcPts val="500"/>
+              </a:spcBef>
+              <a:buFont typeface="Arial" panose="020B0604020202020204" pitchFamily="34" charset="0"/>
+              <a:buChar char="•"/>
+              <a:defRPr sz="2000" kern="1200">
+                <a:solidFill>
+                  <a:schemeClr val="tx1"/>
+                </a:solidFill>
+                <a:latin typeface="+mn-lt"/>
+                <a:ea typeface="+mn-ea"/>
+                <a:cs typeface="+mn-cs"/>
+              </a:defRPr>
+            </a:lvl3pPr>
+            <a:lvl4pPr marL="1600200" indent="-228600" algn="l" defTabSz="914400" rtl="0" eaLnBrk="1" latinLnBrk="0" hangingPunct="1">
+              <a:lnSpc>
+                <a:spcPct val="90000"/>
+              </a:lnSpc>
+              <a:spcBef>
+                <a:spcPts val="500"/>
+              </a:spcBef>
+              <a:buFont typeface="Arial" panose="020B0604020202020204" pitchFamily="34" charset="0"/>
+              <a:buChar char="•"/>
+              <a:defRPr sz="1800" kern="1200">
+                <a:solidFill>
+                  <a:schemeClr val="tx1"/>
+                </a:solidFill>
+                <a:latin typeface="+mn-lt"/>
+                <a:ea typeface="+mn-ea"/>
+                <a:cs typeface="+mn-cs"/>
+              </a:defRPr>
+            </a:lvl4pPr>
+            <a:lvl5pPr marL="2057400" indent="-228600" algn="l" defTabSz="914400" rtl="0" eaLnBrk="1" latinLnBrk="0" hangingPunct="1">
+              <a:lnSpc>
+                <a:spcPct val="90000"/>
+              </a:lnSpc>
+              <a:spcBef>
+                <a:spcPts val="500"/>
+              </a:spcBef>
+              <a:buFont typeface="Arial" panose="020B0604020202020204" pitchFamily="34" charset="0"/>
+              <a:buChar char="•"/>
+              <a:defRPr sz="1800" kern="1200">
+                <a:solidFill>
+                  <a:schemeClr val="tx1"/>
+                </a:solidFill>
+                <a:latin typeface="+mn-lt"/>
+                <a:ea typeface="+mn-ea"/>
+                <a:cs typeface="+mn-cs"/>
+              </a:defRPr>
+            </a:lvl5pPr>
+            <a:lvl6pPr marL="2514600" indent="-228600" algn="l" defTabSz="914400" rtl="0" eaLnBrk="1" latinLnBrk="0" hangingPunct="1">
+              <a:lnSpc>
+                <a:spcPct val="90000"/>
+              </a:lnSpc>
+              <a:spcBef>
+                <a:spcPts val="500"/>
+              </a:spcBef>
+              <a:buFont typeface="Arial" panose="020B0604020202020204" pitchFamily="34" charset="0"/>
+              <a:buChar char="•"/>
+              <a:defRPr sz="1800" kern="1200">
+                <a:solidFill>
+                  <a:schemeClr val="tx1"/>
+                </a:solidFill>
+                <a:latin typeface="+mn-lt"/>
+                <a:ea typeface="+mn-ea"/>
+                <a:cs typeface="+mn-cs"/>
+              </a:defRPr>
+            </a:lvl6pPr>
+            <a:lvl7pPr marL="2971800" indent="-228600" algn="l" defTabSz="914400" rtl="0" eaLnBrk="1" latinLnBrk="0" hangingPunct="1">
+              <a:lnSpc>
+                <a:spcPct val="90000"/>
+              </a:lnSpc>
+              <a:spcBef>
+                <a:spcPts val="500"/>
+              </a:spcBef>
+              <a:buFont typeface="Arial" panose="020B0604020202020204" pitchFamily="34" charset="0"/>
+              <a:buChar char="•"/>
+              <a:defRPr sz="1800" kern="1200">
+                <a:solidFill>
+                  <a:schemeClr val="tx1"/>
+                </a:solidFill>
+                <a:latin typeface="+mn-lt"/>
+                <a:ea typeface="+mn-ea"/>
+                <a:cs typeface="+mn-cs"/>
+              </a:defRPr>
+            </a:lvl7pPr>
+            <a:lvl8pPr marL="3429000" indent="-228600" algn="l" defTabSz="914400" rtl="0" eaLnBrk="1" latinLnBrk="0" hangingPunct="1">
+              <a:lnSpc>
+                <a:spcPct val="90000"/>
+              </a:lnSpc>
+              <a:spcBef>
+                <a:spcPts val="500"/>
+              </a:spcBef>
+              <a:buFont typeface="Arial" panose="020B0604020202020204" pitchFamily="34" charset="0"/>
+              <a:buChar char="•"/>
+              <a:defRPr sz="1800" kern="1200">
+                <a:solidFill>
+                  <a:schemeClr val="tx1"/>
+                </a:solidFill>
+                <a:latin typeface="+mn-lt"/>
+                <a:ea typeface="+mn-ea"/>
+                <a:cs typeface="+mn-cs"/>
+              </a:defRPr>
+            </a:lvl8pPr>
+            <a:lvl9pPr marL="3886200" indent="-228600" algn="l" defTabSz="914400" rtl="0" eaLnBrk="1" latinLnBrk="0" hangingPunct="1">
+              <a:lnSpc>
+                <a:spcPct val="90000"/>
+              </a:lnSpc>
+              <a:spcBef>
+                <a:spcPts val="500"/>
+              </a:spcBef>
+              <a:buFont typeface="Arial" panose="020B0604020202020204" pitchFamily="34" charset="0"/>
+              <a:buChar char="•"/>
+              <a:defRPr sz="1800" kern="1200">
+                <a:solidFill>
+                  <a:schemeClr val="tx1"/>
+                </a:solidFill>
+                <a:latin typeface="+mn-lt"/>
+                <a:ea typeface="+mn-ea"/>
+                <a:cs typeface="+mn-cs"/>
+              </a:defRPr>
+            </a:lvl9pPr>
+          </a:lstStyle>
+          <a:p>
+            <a:r>
+              <a:rPr lang="en-US" dirty="0"/>
+              <a:t>This base class automatically handle </a:t>
+            </a:r>
+            <a:r>
+              <a:rPr lang="en-US" dirty="0" err="1"/>
+              <a:t>pyc</a:t>
+            </a:r>
+            <a:r>
+              <a:rPr lang="en-US" dirty="0"/>
+              <a:t> files generated by Python when it import a module</a:t>
             </a:r>
           </a:p>
         </p:txBody>
@@ -10404,7 +10452,7 @@
     </p:spTree>
     <p:extLst>
       <p:ext uri="{BB962C8B-B14F-4D97-AF65-F5344CB8AC3E}">
-        <p14:creationId xmlns:p14="http://schemas.microsoft.com/office/powerpoint/2010/main" val="851766604"/>
+        <p14:creationId xmlns:p14="http://schemas.microsoft.com/office/powerpoint/2010/main" val="1713227851"/>
       </p:ext>
     </p:extLst>
   </p:cSld>
@@ -10450,7 +10498,7 @@
         <p:spPr>
           <a:xfrm>
             <a:off x="838200" y="1825625"/>
-            <a:ext cx="10515600" cy="1481246"/>
+            <a:ext cx="10515600" cy="955153"/>
           </a:xfrm>
         </p:spPr>
         <p:txBody>
@@ -10475,7 +10523,7 @@
             </a:r>
             <a:r>
               <a:rPr lang="en-US" dirty="0" err="1"/>
-              <a:t>lmake.AntiRule</a:t>
+              <a:t>lmake.DynPyRule</a:t>
             </a:r>
             <a:r>
               <a:rPr lang="en-US" dirty="0"/>
@@ -10489,17 +10537,7 @@
             </a:pPr>
             <a:r>
               <a:rPr lang="en-US" dirty="0"/>
-              <a:t>stems = { ‘File’ : ’.*’ }</a:t>
-            </a:r>
-          </a:p>
-          <a:p>
-            <a:pPr marL="457200" lvl="1" indent="0">
-              <a:buFont typeface="Arial" panose="020B0604020202020204" pitchFamily="34" charset="0"/>
-              <a:buNone/>
-            </a:pPr>
-            <a:r>
-              <a:rPr lang="en-US" dirty="0"/>
-              <a:t>targets = { ‘DST’ : ‘{File}.foo’ }</a:t>
+              <a:t>…</a:t>
             </a:r>
           </a:p>
         </p:txBody>
@@ -10526,9 +10564,10 @@
           <a:lstStyle/>
           <a:p>
             <a:r>
-              <a:rPr lang="en-US" dirty="0"/>
-              <a:t>anti-rules</a:t>
-            </a:r>
+              <a:rPr lang="en-US" dirty="0" err="1"/>
+              <a:t>DynPyRule</a:t>
+            </a:r>
+            <a:endParaRPr lang="en-US" dirty="0"/>
           </a:p>
         </p:txBody>
       </p:sp>
@@ -10548,8 +10587,8 @@
         </p:nvSpPr>
         <p:spPr>
           <a:xfrm>
-            <a:off x="838200" y="3427912"/>
-            <a:ext cx="10515600" cy="2960361"/>
+            <a:off x="838200" y="2780778"/>
+            <a:ext cx="10515600" cy="3607495"/>
           </a:xfrm>
           <a:prstGeom prst="rect">
             <a:avLst/>
@@ -10726,31 +10765,53 @@
           <a:p>
             <a:r>
               <a:rPr lang="en-US" dirty="0"/>
-              <a:t>Anti-rules are used to mentioned that some targets cannot be selected by other rules</a:t>
-            </a:r>
-          </a:p>
-          <a:p>
-            <a:r>
-              <a:rPr lang="en-US" dirty="0"/>
-              <a:t>Used to avoid infinite recursions in situations like :</a:t>
-            </a:r>
-          </a:p>
-          <a:p>
-            <a:pPr lvl="1"/>
-            <a:r>
-              <a:rPr lang="en-US" dirty="0"/>
-              <a:t>generate {File} from {File}.c</a:t>
-            </a:r>
-          </a:p>
-          <a:p>
-            <a:pPr lvl="1"/>
-            <a:r>
-              <a:rPr lang="en-US" dirty="0"/>
-              <a:t>set anti-rule for {File}.</a:t>
+              <a:t>This base class modifies the Python import machinery to ensure that importing a module that does not exist will still generate a dep to it so as to give </a:t>
             </a:r>
             <a:r>
               <a:rPr lang="en-US" dirty="0" err="1"/>
-              <a:t>c.c</a:t>
+              <a:t>lmake</a:t>
+            </a:r>
+            <a:r>
+              <a:rPr lang="en-US" dirty="0"/>
+              <a:t> a chance to derive it if possible</a:t>
+            </a:r>
+          </a:p>
+          <a:p>
+            <a:r>
+              <a:rPr lang="en-US" dirty="0"/>
+              <a:t>This is done by ensuring Python reads the .</a:t>
+            </a:r>
+            <a:r>
+              <a:rPr lang="en-US" dirty="0" err="1"/>
+              <a:t>py</a:t>
+            </a:r>
+            <a:r>
+              <a:rPr lang="en-US" dirty="0"/>
+              <a:t> and/or the .so file</a:t>
+            </a:r>
+          </a:p>
+          <a:p>
+            <a:r>
+              <a:rPr lang="en-US" dirty="0"/>
+              <a:t>The default Python import machinery optimizes this situation by not reading the file at all, defeating </a:t>
+            </a:r>
+            <a:r>
+              <a:rPr lang="en-US" dirty="0" err="1"/>
+              <a:t>lmake</a:t>
+            </a:r>
+            <a:r>
+              <a:rPr lang="en-US" dirty="0"/>
+              <a:t> auto-dependency mechanism</a:t>
+            </a:r>
+          </a:p>
+          <a:p>
+            <a:r>
+              <a:rPr lang="en-US" dirty="0"/>
+              <a:t>You can also simply call </a:t>
+            </a:r>
+            <a:r>
+              <a:rPr lang="en-US" dirty="0" err="1"/>
+              <a:t>lmake.fix_import</a:t>
             </a:r>
             <a:endParaRPr lang="en-US" dirty="0"/>
           </a:p>
@@ -10759,7 +10820,7 @@
     </p:spTree>
     <p:extLst>
       <p:ext uri="{BB962C8B-B14F-4D97-AF65-F5344CB8AC3E}">
-        <p14:creationId xmlns:p14="http://schemas.microsoft.com/office/powerpoint/2010/main" val="1732704744"/>
+        <p14:creationId xmlns:p14="http://schemas.microsoft.com/office/powerpoint/2010/main" val="3669104191"/>
       </p:ext>
     </p:extLst>
   </p:cSld>
@@ -10802,49 +10863,57 @@
             <p:ph idx="1"/>
           </p:nvPr>
         </p:nvSpPr>
-        <p:spPr>
-          <a:xfrm>
-            <a:off x="838200" y="1825625"/>
-            <a:ext cx="10515600" cy="955153"/>
-          </a:xfrm>
-        </p:spPr>
+        <p:spPr/>
         <p:txBody>
           <a:bodyPr/>
           <a:lstStyle/>
           <a:p>
-            <a:pPr marL="0" indent="0">
-              <a:buFont typeface="Arial" panose="020B0604020202020204" pitchFamily="34" charset="0"/>
-              <a:buNone/>
-            </a:pPr>
-            <a:r>
-              <a:rPr lang="en-US" dirty="0"/>
-              <a:t>class </a:t>
+            <a:r>
+              <a:rPr lang="en-US" dirty="0"/>
+              <a:t>If a file name matches several targets, the first one in declaration order is deemed to be the matching one</a:t>
+            </a:r>
+          </a:p>
+          <a:p>
+            <a:r>
+              <a:rPr lang="en-US" dirty="0"/>
+              <a:t>For example if targets contain</a:t>
+            </a:r>
+          </a:p>
+          <a:p>
+            <a:pPr lvl="1"/>
+            <a:r>
+              <a:rPr lang="en-US" dirty="0"/>
+              <a:t>{File}.a</a:t>
+            </a:r>
+          </a:p>
+          <a:p>
+            <a:pPr lvl="1"/>
+            <a:r>
+              <a:rPr lang="en-US" dirty="0"/>
+              <a:t>b/{File}</a:t>
+            </a:r>
+          </a:p>
+          <a:p>
+            <a:pPr lvl="1"/>
+            <a:r>
+              <a:rPr lang="en-US" dirty="0"/>
+              <a:t>file b/</a:t>
             </a:r>
             <a:r>
               <a:rPr lang="en-US" dirty="0" err="1"/>
-              <a:t>MyCommand</a:t>
-            </a:r>
-            <a:r>
-              <a:rPr lang="en-US" dirty="0"/>
-              <a:t>(</a:t>
+              <a:t>foo.a</a:t>
+            </a:r>
+            <a:r>
+              <a:rPr lang="en-US" dirty="0"/>
+              <a:t> would match {File}.a (File is defined as b/foo) rather than b/{File} (File is not defined as </a:t>
             </a:r>
             <a:r>
               <a:rPr lang="en-US" dirty="0" err="1"/>
-              <a:t>lmake.PyRule</a:t>
-            </a:r>
-            <a:r>
-              <a:rPr lang="en-US" dirty="0"/>
-              <a:t>) :</a:t>
-            </a:r>
-          </a:p>
-          <a:p>
-            <a:pPr marL="457200" lvl="1" indent="0">
-              <a:buFont typeface="Arial" panose="020B0604020202020204" pitchFamily="34" charset="0"/>
-              <a:buNone/>
-            </a:pPr>
-            <a:r>
-              <a:rPr lang="en-US" dirty="0"/>
-              <a:t>…</a:t>
+              <a:t>foo.a</a:t>
+            </a:r>
+            <a:r>
+              <a:rPr lang="en-US" dirty="0"/>
+              <a:t>)</a:t>
             </a:r>
           </a:p>
         </p:txBody>
@@ -10871,216 +10940,8 @@
           <a:lstStyle/>
           <a:p>
             <a:r>
-              <a:rPr lang="en-US" dirty="0" err="1"/>
-              <a:t>PyRule</a:t>
-            </a:r>
-            <a:endParaRPr lang="en-US" dirty="0"/>
-          </a:p>
-        </p:txBody>
-      </p:sp>
-      <p:sp>
-        <p:nvSpPr>
-          <p:cNvPr id="3" name="Espace réservé du contenu 7">
-            <a:extLst>
-              <a:ext uri="{FF2B5EF4-FFF2-40B4-BE49-F238E27FC236}">
-                <a16:creationId xmlns:a16="http://schemas.microsoft.com/office/drawing/2014/main" id="{94B4E811-FA5A-FD44-CD42-6B828C90D802}"/>
-              </a:ext>
-            </a:extLst>
-          </p:cNvPr>
-          <p:cNvSpPr txBox="1">
-            <a:spLocks/>
-          </p:cNvSpPr>
-          <p:nvPr/>
-        </p:nvSpPr>
-        <p:spPr>
-          <a:xfrm>
-            <a:off x="838200" y="2780778"/>
-            <a:ext cx="10515600" cy="3607495"/>
-          </a:xfrm>
-          <a:prstGeom prst="rect">
-            <a:avLst/>
-          </a:prstGeom>
-        </p:spPr>
-        <p:txBody>
-          <a:bodyPr vert="horz" lIns="91440" tIns="45720" rIns="91440" bIns="45720" rtlCol="0">
-            <a:normAutofit/>
-          </a:bodyPr>
-          <a:lstStyle>
-            <a:lvl1pPr marL="228600" indent="-228600" algn="l" defTabSz="914400" rtl="0" eaLnBrk="1" latinLnBrk="0" hangingPunct="1">
-              <a:lnSpc>
-                <a:spcPct val="90000"/>
-              </a:lnSpc>
-              <a:spcBef>
-                <a:spcPts val="1000"/>
-              </a:spcBef>
-              <a:buFont typeface="Arial" panose="020B0604020202020204" pitchFamily="34" charset="0"/>
-              <a:buChar char="•"/>
-              <a:defRPr sz="2800" kern="1200">
-                <a:solidFill>
-                  <a:schemeClr val="tx1"/>
-                </a:solidFill>
-                <a:latin typeface="+mn-lt"/>
-                <a:ea typeface="+mn-ea"/>
-                <a:cs typeface="+mn-cs"/>
-              </a:defRPr>
-            </a:lvl1pPr>
-            <a:lvl2pPr marL="685800" indent="-228600" algn="l" defTabSz="914400" rtl="0" eaLnBrk="1" latinLnBrk="0" hangingPunct="1">
-              <a:lnSpc>
-                <a:spcPct val="90000"/>
-              </a:lnSpc>
-              <a:spcBef>
-                <a:spcPts val="500"/>
-              </a:spcBef>
-              <a:buFont typeface="Arial" panose="020B0604020202020204" pitchFamily="34" charset="0"/>
-              <a:buChar char="•"/>
-              <a:defRPr sz="2400" kern="1200">
-                <a:solidFill>
-                  <a:schemeClr val="tx1"/>
-                </a:solidFill>
-                <a:latin typeface="+mn-lt"/>
-                <a:ea typeface="+mn-ea"/>
-                <a:cs typeface="+mn-cs"/>
-              </a:defRPr>
-            </a:lvl2pPr>
-            <a:lvl3pPr marL="1143000" indent="-228600" algn="l" defTabSz="914400" rtl="0" eaLnBrk="1" latinLnBrk="0" hangingPunct="1">
-              <a:lnSpc>
-                <a:spcPct val="90000"/>
-              </a:lnSpc>
-              <a:spcBef>
-                <a:spcPts val="500"/>
-              </a:spcBef>
-              <a:buFont typeface="Arial" panose="020B0604020202020204" pitchFamily="34" charset="0"/>
-              <a:buChar char="•"/>
-              <a:defRPr sz="2000" kern="1200">
-                <a:solidFill>
-                  <a:schemeClr val="tx1"/>
-                </a:solidFill>
-                <a:latin typeface="+mn-lt"/>
-                <a:ea typeface="+mn-ea"/>
-                <a:cs typeface="+mn-cs"/>
-              </a:defRPr>
-            </a:lvl3pPr>
-            <a:lvl4pPr marL="1600200" indent="-228600" algn="l" defTabSz="914400" rtl="0" eaLnBrk="1" latinLnBrk="0" hangingPunct="1">
-              <a:lnSpc>
-                <a:spcPct val="90000"/>
-              </a:lnSpc>
-              <a:spcBef>
-                <a:spcPts val="500"/>
-              </a:spcBef>
-              <a:buFont typeface="Arial" panose="020B0604020202020204" pitchFamily="34" charset="0"/>
-              <a:buChar char="•"/>
-              <a:defRPr sz="1800" kern="1200">
-                <a:solidFill>
-                  <a:schemeClr val="tx1"/>
-                </a:solidFill>
-                <a:latin typeface="+mn-lt"/>
-                <a:ea typeface="+mn-ea"/>
-                <a:cs typeface="+mn-cs"/>
-              </a:defRPr>
-            </a:lvl4pPr>
-            <a:lvl5pPr marL="2057400" indent="-228600" algn="l" defTabSz="914400" rtl="0" eaLnBrk="1" latinLnBrk="0" hangingPunct="1">
-              <a:lnSpc>
-                <a:spcPct val="90000"/>
-              </a:lnSpc>
-              <a:spcBef>
-                <a:spcPts val="500"/>
-              </a:spcBef>
-              <a:buFont typeface="Arial" panose="020B0604020202020204" pitchFamily="34" charset="0"/>
-              <a:buChar char="•"/>
-              <a:defRPr sz="1800" kern="1200">
-                <a:solidFill>
-                  <a:schemeClr val="tx1"/>
-                </a:solidFill>
-                <a:latin typeface="+mn-lt"/>
-                <a:ea typeface="+mn-ea"/>
-                <a:cs typeface="+mn-cs"/>
-              </a:defRPr>
-            </a:lvl5pPr>
-            <a:lvl6pPr marL="2514600" indent="-228600" algn="l" defTabSz="914400" rtl="0" eaLnBrk="1" latinLnBrk="0" hangingPunct="1">
-              <a:lnSpc>
-                <a:spcPct val="90000"/>
-              </a:lnSpc>
-              <a:spcBef>
-                <a:spcPts val="500"/>
-              </a:spcBef>
-              <a:buFont typeface="Arial" panose="020B0604020202020204" pitchFamily="34" charset="0"/>
-              <a:buChar char="•"/>
-              <a:defRPr sz="1800" kern="1200">
-                <a:solidFill>
-                  <a:schemeClr val="tx1"/>
-                </a:solidFill>
-                <a:latin typeface="+mn-lt"/>
-                <a:ea typeface="+mn-ea"/>
-                <a:cs typeface="+mn-cs"/>
-              </a:defRPr>
-            </a:lvl6pPr>
-            <a:lvl7pPr marL="2971800" indent="-228600" algn="l" defTabSz="914400" rtl="0" eaLnBrk="1" latinLnBrk="0" hangingPunct="1">
-              <a:lnSpc>
-                <a:spcPct val="90000"/>
-              </a:lnSpc>
-              <a:spcBef>
-                <a:spcPts val="500"/>
-              </a:spcBef>
-              <a:buFont typeface="Arial" panose="020B0604020202020204" pitchFamily="34" charset="0"/>
-              <a:buChar char="•"/>
-              <a:defRPr sz="1800" kern="1200">
-                <a:solidFill>
-                  <a:schemeClr val="tx1"/>
-                </a:solidFill>
-                <a:latin typeface="+mn-lt"/>
-                <a:ea typeface="+mn-ea"/>
-                <a:cs typeface="+mn-cs"/>
-              </a:defRPr>
-            </a:lvl7pPr>
-            <a:lvl8pPr marL="3429000" indent="-228600" algn="l" defTabSz="914400" rtl="0" eaLnBrk="1" latinLnBrk="0" hangingPunct="1">
-              <a:lnSpc>
-                <a:spcPct val="90000"/>
-              </a:lnSpc>
-              <a:spcBef>
-                <a:spcPts val="500"/>
-              </a:spcBef>
-              <a:buFont typeface="Arial" panose="020B0604020202020204" pitchFamily="34" charset="0"/>
-              <a:buChar char="•"/>
-              <a:defRPr sz="1800" kern="1200">
-                <a:solidFill>
-                  <a:schemeClr val="tx1"/>
-                </a:solidFill>
-                <a:latin typeface="+mn-lt"/>
-                <a:ea typeface="+mn-ea"/>
-                <a:cs typeface="+mn-cs"/>
-              </a:defRPr>
-            </a:lvl8pPr>
-            <a:lvl9pPr marL="3886200" indent="-228600" algn="l" defTabSz="914400" rtl="0" eaLnBrk="1" latinLnBrk="0" hangingPunct="1">
-              <a:lnSpc>
-                <a:spcPct val="90000"/>
-              </a:lnSpc>
-              <a:spcBef>
-                <a:spcPts val="500"/>
-              </a:spcBef>
-              <a:buFont typeface="Arial" panose="020B0604020202020204" pitchFamily="34" charset="0"/>
-              <a:buChar char="•"/>
-              <a:defRPr sz="1800" kern="1200">
-                <a:solidFill>
-                  <a:schemeClr val="tx1"/>
-                </a:solidFill>
-                <a:latin typeface="+mn-lt"/>
-                <a:ea typeface="+mn-ea"/>
-                <a:cs typeface="+mn-cs"/>
-              </a:defRPr>
-            </a:lvl9pPr>
-          </a:lstStyle>
-          <a:p>
-            <a:r>
-              <a:rPr lang="en-US" dirty="0"/>
-              <a:t>This base class automatically handle </a:t>
-            </a:r>
-            <a:r>
-              <a:rPr lang="en-US" dirty="0" err="1"/>
-              <a:t>pyc</a:t>
-            </a:r>
-            <a:r>
-              <a:rPr lang="en-US" dirty="0"/>
-              <a:t> files generated by Python when it import a module</a:t>
+              <a:rPr lang="en-US" dirty="0"/>
+              <a:t>target conflicts</a:t>
             </a:r>
           </a:p>
         </p:txBody>
@@ -11088,7 +10949,7 @@
     </p:spTree>
     <p:extLst>
       <p:ext uri="{BB962C8B-B14F-4D97-AF65-F5344CB8AC3E}">
-        <p14:creationId xmlns:p14="http://schemas.microsoft.com/office/powerpoint/2010/main" val="1713227851"/>
+        <p14:creationId xmlns:p14="http://schemas.microsoft.com/office/powerpoint/2010/main" val="2180855422"/>
       </p:ext>
     </p:extLst>
   </p:cSld>
@@ -11273,50 +11134,58 @@
             <p:ph idx="1"/>
           </p:nvPr>
         </p:nvSpPr>
-        <p:spPr>
-          <a:xfrm>
-            <a:off x="838200" y="1825625"/>
-            <a:ext cx="10515600" cy="955153"/>
-          </a:xfrm>
-        </p:spPr>
+        <p:spPr/>
         <p:txBody>
           <a:bodyPr/>
           <a:lstStyle/>
           <a:p>
-            <a:pPr marL="0" indent="0">
-              <a:buFont typeface="Arial" panose="020B0604020202020204" pitchFamily="34" charset="0"/>
-              <a:buNone/>
-            </a:pPr>
-            <a:r>
-              <a:rPr lang="en-US" dirty="0"/>
-              <a:t>class </a:t>
+            <a:r>
+              <a:rPr lang="en-US" dirty="0"/>
+              <a:t>config is specified by the </a:t>
             </a:r>
             <a:r>
               <a:rPr lang="en-US" dirty="0" err="1"/>
-              <a:t>MyCommand</a:t>
-            </a:r>
-            <a:r>
-              <a:rPr lang="en-US" dirty="0"/>
-              <a:t>(</a:t>
+              <a:t>lmake.config</a:t>
+            </a:r>
+            <a:r>
+              <a:rPr lang="en-US" dirty="0"/>
+              <a:t> variable</a:t>
+            </a:r>
+          </a:p>
+          <a:p>
+            <a:pPr lvl="1"/>
+            <a:r>
+              <a:rPr lang="en-US" dirty="0"/>
+              <a:t>it contains a default value that can be overwritten by </a:t>
             </a:r>
             <a:r>
               <a:rPr lang="en-US" dirty="0" err="1"/>
-              <a:t>lmake.DynPyRule</a:t>
-            </a:r>
-            <a:r>
-              <a:rPr lang="en-US" dirty="0"/>
-              <a:t>) :</a:t>
-            </a:r>
-          </a:p>
-          <a:p>
-            <a:pPr marL="457200" lvl="1" indent="0">
-              <a:buFont typeface="Arial" panose="020B0604020202020204" pitchFamily="34" charset="0"/>
-              <a:buNone/>
-            </a:pPr>
-            <a:r>
-              <a:rPr lang="en-US" dirty="0"/>
-              <a:t>…</a:t>
-            </a:r>
+              <a:t>Lmakefile.py</a:t>
+            </a:r>
+            <a:endParaRPr lang="en-US" dirty="0"/>
+          </a:p>
+          <a:p>
+            <a:r>
+              <a:rPr lang="en-US" dirty="0" err="1"/>
+              <a:t>cf</a:t>
+            </a:r>
+            <a:r>
+              <a:rPr lang="en-US" dirty="0"/>
+              <a:t> </a:t>
+            </a:r>
+            <a:r>
+              <a:rPr lang="en-US" dirty="0" err="1"/>
+              <a:t>lmake.py</a:t>
+            </a:r>
+            <a:r>
+              <a:rPr lang="en-US" dirty="0"/>
+              <a:t> file for a detailed description of the entries and the </a:t>
+            </a:r>
+            <a:r>
+              <a:rPr lang="en-US"/>
+              <a:t>default values</a:t>
+            </a:r>
+            <a:endParaRPr lang="en-US" dirty="0"/>
           </a:p>
         </p:txBody>
       </p:sp>
@@ -11342,263 +11211,16 @@
           <a:lstStyle/>
           <a:p>
             <a:r>
-              <a:rPr lang="en-US" dirty="0" err="1"/>
-              <a:t>DynPyRule</a:t>
-            </a:r>
-            <a:endParaRPr lang="en-US" dirty="0"/>
-          </a:p>
-        </p:txBody>
-      </p:sp>
-      <p:sp>
-        <p:nvSpPr>
-          <p:cNvPr id="3" name="Espace réservé du contenu 7">
-            <a:extLst>
-              <a:ext uri="{FF2B5EF4-FFF2-40B4-BE49-F238E27FC236}">
-                <a16:creationId xmlns:a16="http://schemas.microsoft.com/office/drawing/2014/main" id="{94B4E811-FA5A-FD44-CD42-6B828C90D802}"/>
-              </a:ext>
-            </a:extLst>
-          </p:cNvPr>
-          <p:cNvSpPr txBox="1">
-            <a:spLocks/>
-          </p:cNvSpPr>
-          <p:nvPr/>
-        </p:nvSpPr>
-        <p:spPr>
-          <a:xfrm>
-            <a:off x="838200" y="2780778"/>
-            <a:ext cx="10515600" cy="3607495"/>
-          </a:xfrm>
-          <a:prstGeom prst="rect">
-            <a:avLst/>
-          </a:prstGeom>
-        </p:spPr>
-        <p:txBody>
-          <a:bodyPr vert="horz" lIns="91440" tIns="45720" rIns="91440" bIns="45720" rtlCol="0">
-            <a:normAutofit/>
-          </a:bodyPr>
-          <a:lstStyle>
-            <a:lvl1pPr marL="228600" indent="-228600" algn="l" defTabSz="914400" rtl="0" eaLnBrk="1" latinLnBrk="0" hangingPunct="1">
-              <a:lnSpc>
-                <a:spcPct val="90000"/>
-              </a:lnSpc>
-              <a:spcBef>
-                <a:spcPts val="1000"/>
-              </a:spcBef>
-              <a:buFont typeface="Arial" panose="020B0604020202020204" pitchFamily="34" charset="0"/>
-              <a:buChar char="•"/>
-              <a:defRPr sz="2800" kern="1200">
-                <a:solidFill>
-                  <a:schemeClr val="tx1"/>
-                </a:solidFill>
-                <a:latin typeface="+mn-lt"/>
-                <a:ea typeface="+mn-ea"/>
-                <a:cs typeface="+mn-cs"/>
-              </a:defRPr>
-            </a:lvl1pPr>
-            <a:lvl2pPr marL="685800" indent="-228600" algn="l" defTabSz="914400" rtl="0" eaLnBrk="1" latinLnBrk="0" hangingPunct="1">
-              <a:lnSpc>
-                <a:spcPct val="90000"/>
-              </a:lnSpc>
-              <a:spcBef>
-                <a:spcPts val="500"/>
-              </a:spcBef>
-              <a:buFont typeface="Arial" panose="020B0604020202020204" pitchFamily="34" charset="0"/>
-              <a:buChar char="•"/>
-              <a:defRPr sz="2400" kern="1200">
-                <a:solidFill>
-                  <a:schemeClr val="tx1"/>
-                </a:solidFill>
-                <a:latin typeface="+mn-lt"/>
-                <a:ea typeface="+mn-ea"/>
-                <a:cs typeface="+mn-cs"/>
-              </a:defRPr>
-            </a:lvl2pPr>
-            <a:lvl3pPr marL="1143000" indent="-228600" algn="l" defTabSz="914400" rtl="0" eaLnBrk="1" latinLnBrk="0" hangingPunct="1">
-              <a:lnSpc>
-                <a:spcPct val="90000"/>
-              </a:lnSpc>
-              <a:spcBef>
-                <a:spcPts val="500"/>
-              </a:spcBef>
-              <a:buFont typeface="Arial" panose="020B0604020202020204" pitchFamily="34" charset="0"/>
-              <a:buChar char="•"/>
-              <a:defRPr sz="2000" kern="1200">
-                <a:solidFill>
-                  <a:schemeClr val="tx1"/>
-                </a:solidFill>
-                <a:latin typeface="+mn-lt"/>
-                <a:ea typeface="+mn-ea"/>
-                <a:cs typeface="+mn-cs"/>
-              </a:defRPr>
-            </a:lvl3pPr>
-            <a:lvl4pPr marL="1600200" indent="-228600" algn="l" defTabSz="914400" rtl="0" eaLnBrk="1" latinLnBrk="0" hangingPunct="1">
-              <a:lnSpc>
-                <a:spcPct val="90000"/>
-              </a:lnSpc>
-              <a:spcBef>
-                <a:spcPts val="500"/>
-              </a:spcBef>
-              <a:buFont typeface="Arial" panose="020B0604020202020204" pitchFamily="34" charset="0"/>
-              <a:buChar char="•"/>
-              <a:defRPr sz="1800" kern="1200">
-                <a:solidFill>
-                  <a:schemeClr val="tx1"/>
-                </a:solidFill>
-                <a:latin typeface="+mn-lt"/>
-                <a:ea typeface="+mn-ea"/>
-                <a:cs typeface="+mn-cs"/>
-              </a:defRPr>
-            </a:lvl4pPr>
-            <a:lvl5pPr marL="2057400" indent="-228600" algn="l" defTabSz="914400" rtl="0" eaLnBrk="1" latinLnBrk="0" hangingPunct="1">
-              <a:lnSpc>
-                <a:spcPct val="90000"/>
-              </a:lnSpc>
-              <a:spcBef>
-                <a:spcPts val="500"/>
-              </a:spcBef>
-              <a:buFont typeface="Arial" panose="020B0604020202020204" pitchFamily="34" charset="0"/>
-              <a:buChar char="•"/>
-              <a:defRPr sz="1800" kern="1200">
-                <a:solidFill>
-                  <a:schemeClr val="tx1"/>
-                </a:solidFill>
-                <a:latin typeface="+mn-lt"/>
-                <a:ea typeface="+mn-ea"/>
-                <a:cs typeface="+mn-cs"/>
-              </a:defRPr>
-            </a:lvl5pPr>
-            <a:lvl6pPr marL="2514600" indent="-228600" algn="l" defTabSz="914400" rtl="0" eaLnBrk="1" latinLnBrk="0" hangingPunct="1">
-              <a:lnSpc>
-                <a:spcPct val="90000"/>
-              </a:lnSpc>
-              <a:spcBef>
-                <a:spcPts val="500"/>
-              </a:spcBef>
-              <a:buFont typeface="Arial" panose="020B0604020202020204" pitchFamily="34" charset="0"/>
-              <a:buChar char="•"/>
-              <a:defRPr sz="1800" kern="1200">
-                <a:solidFill>
-                  <a:schemeClr val="tx1"/>
-                </a:solidFill>
-                <a:latin typeface="+mn-lt"/>
-                <a:ea typeface="+mn-ea"/>
-                <a:cs typeface="+mn-cs"/>
-              </a:defRPr>
-            </a:lvl6pPr>
-            <a:lvl7pPr marL="2971800" indent="-228600" algn="l" defTabSz="914400" rtl="0" eaLnBrk="1" latinLnBrk="0" hangingPunct="1">
-              <a:lnSpc>
-                <a:spcPct val="90000"/>
-              </a:lnSpc>
-              <a:spcBef>
-                <a:spcPts val="500"/>
-              </a:spcBef>
-              <a:buFont typeface="Arial" panose="020B0604020202020204" pitchFamily="34" charset="0"/>
-              <a:buChar char="•"/>
-              <a:defRPr sz="1800" kern="1200">
-                <a:solidFill>
-                  <a:schemeClr val="tx1"/>
-                </a:solidFill>
-                <a:latin typeface="+mn-lt"/>
-                <a:ea typeface="+mn-ea"/>
-                <a:cs typeface="+mn-cs"/>
-              </a:defRPr>
-            </a:lvl7pPr>
-            <a:lvl8pPr marL="3429000" indent="-228600" algn="l" defTabSz="914400" rtl="0" eaLnBrk="1" latinLnBrk="0" hangingPunct="1">
-              <a:lnSpc>
-                <a:spcPct val="90000"/>
-              </a:lnSpc>
-              <a:spcBef>
-                <a:spcPts val="500"/>
-              </a:spcBef>
-              <a:buFont typeface="Arial" panose="020B0604020202020204" pitchFamily="34" charset="0"/>
-              <a:buChar char="•"/>
-              <a:defRPr sz="1800" kern="1200">
-                <a:solidFill>
-                  <a:schemeClr val="tx1"/>
-                </a:solidFill>
-                <a:latin typeface="+mn-lt"/>
-                <a:ea typeface="+mn-ea"/>
-                <a:cs typeface="+mn-cs"/>
-              </a:defRPr>
-            </a:lvl8pPr>
-            <a:lvl9pPr marL="3886200" indent="-228600" algn="l" defTabSz="914400" rtl="0" eaLnBrk="1" latinLnBrk="0" hangingPunct="1">
-              <a:lnSpc>
-                <a:spcPct val="90000"/>
-              </a:lnSpc>
-              <a:spcBef>
-                <a:spcPts val="500"/>
-              </a:spcBef>
-              <a:buFont typeface="Arial" panose="020B0604020202020204" pitchFamily="34" charset="0"/>
-              <a:buChar char="•"/>
-              <a:defRPr sz="1800" kern="1200">
-                <a:solidFill>
-                  <a:schemeClr val="tx1"/>
-                </a:solidFill>
-                <a:latin typeface="+mn-lt"/>
-                <a:ea typeface="+mn-ea"/>
-                <a:cs typeface="+mn-cs"/>
-              </a:defRPr>
-            </a:lvl9pPr>
-          </a:lstStyle>
-          <a:p>
-            <a:r>
-              <a:rPr lang="en-US" dirty="0"/>
-              <a:t>This base class modifies the Python import machinery to ensure that importing a module that does not exist will still generate a dep to it so as to give </a:t>
-            </a:r>
-            <a:r>
-              <a:rPr lang="en-US" dirty="0" err="1"/>
-              <a:t>lmake</a:t>
-            </a:r>
-            <a:r>
-              <a:rPr lang="en-US" dirty="0"/>
-              <a:t> a chance to derive it if possible</a:t>
-            </a:r>
-          </a:p>
-          <a:p>
-            <a:r>
-              <a:rPr lang="en-US" dirty="0"/>
-              <a:t>This is done by ensuring Python reads the .</a:t>
-            </a:r>
-            <a:r>
-              <a:rPr lang="en-US" dirty="0" err="1"/>
-              <a:t>py</a:t>
-            </a:r>
-            <a:r>
-              <a:rPr lang="en-US" dirty="0"/>
-              <a:t> and/or the .so file</a:t>
-            </a:r>
-          </a:p>
-          <a:p>
-            <a:r>
-              <a:rPr lang="en-US" dirty="0"/>
-              <a:t>The default Python import machinery optimizes this situation by not reading the file at all, defeating </a:t>
-            </a:r>
-            <a:r>
-              <a:rPr lang="en-US" dirty="0" err="1"/>
-              <a:t>lmake</a:t>
-            </a:r>
-            <a:r>
-              <a:rPr lang="en-US" dirty="0"/>
-              <a:t> auto-dependency mechanism</a:t>
-            </a:r>
-          </a:p>
-          <a:p>
-            <a:r>
-              <a:rPr lang="en-US" dirty="0"/>
-              <a:t>You can also simply call </a:t>
-            </a:r>
-            <a:r>
-              <a:rPr lang="en-US" dirty="0" err="1"/>
-              <a:t>lmake.fix_import</a:t>
-            </a:r>
-            <a:endParaRPr lang="en-US" dirty="0"/>
+              <a:rPr lang="en-US" dirty="0"/>
+              <a:t>config</a:t>
+            </a:r>
           </a:p>
         </p:txBody>
       </p:sp>
     </p:spTree>
     <p:extLst>
       <p:ext uri="{BB962C8B-B14F-4D97-AF65-F5344CB8AC3E}">
-        <p14:creationId xmlns:p14="http://schemas.microsoft.com/office/powerpoint/2010/main" val="3669104191"/>
+        <p14:creationId xmlns:p14="http://schemas.microsoft.com/office/powerpoint/2010/main" val="133917431"/>
       </p:ext>
     </p:extLst>
   </p:cSld>
@@ -11648,50 +11270,21 @@
           <a:p>
             <a:r>
               <a:rPr lang="en-US" dirty="0"/>
-              <a:t>If a file name matches several targets, the first one in declaration order is deemed to be the matching one</a:t>
-            </a:r>
-          </a:p>
-          <a:p>
-            <a:r>
-              <a:rPr lang="en-US" dirty="0"/>
-              <a:t>For example if targets contain</a:t>
-            </a:r>
-          </a:p>
-          <a:p>
-            <a:pPr lvl="1"/>
-            <a:r>
-              <a:rPr lang="en-US" dirty="0"/>
-              <a:t>{File}.a</a:t>
-            </a:r>
-          </a:p>
-          <a:p>
-            <a:pPr lvl="1"/>
-            <a:r>
-              <a:rPr lang="en-US" dirty="0"/>
-              <a:t>b/{File}</a:t>
-            </a:r>
-          </a:p>
-          <a:p>
-            <a:pPr lvl="1"/>
-            <a:r>
-              <a:rPr lang="en-US" dirty="0"/>
-              <a:t>file b/</a:t>
+              <a:t>Normally, writing to stderr is a reason for a job to be in error</a:t>
+            </a:r>
+          </a:p>
+          <a:p>
+            <a:r>
+              <a:rPr lang="en-US" dirty="0"/>
+              <a:t>This can be turned into a warning by setting the </a:t>
             </a:r>
             <a:r>
               <a:rPr lang="en-US" dirty="0" err="1"/>
-              <a:t>foo.a</a:t>
-            </a:r>
-            <a:r>
-              <a:rPr lang="en-US" dirty="0"/>
-              <a:t> would match {File}.a (File is defined as b/foo) rather than b/{File} (File is not defined as </a:t>
-            </a:r>
-            <a:r>
-              <a:rPr lang="en-US" dirty="0" err="1"/>
-              <a:t>foo.a</a:t>
-            </a:r>
-            <a:r>
-              <a:rPr lang="en-US" dirty="0"/>
-              <a:t>)</a:t>
+              <a:t>allow_stderr</a:t>
+            </a:r>
+            <a:r>
+              <a:rPr lang="en-US" dirty="0"/>
+              <a:t> attribute to True</a:t>
             </a:r>
           </a:p>
         </p:txBody>
@@ -11719,7 +11312,7 @@
           <a:p>
             <a:r>
               <a:rPr lang="en-US" dirty="0"/>
-              <a:t>target conflicts</a:t>
+              <a:t>stderr</a:t>
             </a:r>
           </a:p>
         </p:txBody>
@@ -11727,7 +11320,7 @@
     </p:spTree>
     <p:extLst>
       <p:ext uri="{BB962C8B-B14F-4D97-AF65-F5344CB8AC3E}">
-        <p14:creationId xmlns:p14="http://schemas.microsoft.com/office/powerpoint/2010/main" val="2180855422"/>
+        <p14:creationId xmlns:p14="http://schemas.microsoft.com/office/powerpoint/2010/main" val="3885853816"/>
       </p:ext>
     </p:extLst>
   </p:cSld>
@@ -11772,470 +11365,20 @@
         </p:nvSpPr>
         <p:spPr/>
         <p:txBody>
-          <a:bodyPr/>
-          <a:lstStyle/>
-          <a:p>
-            <a:r>
-              <a:rPr lang="en-US" dirty="0"/>
-              <a:t>config is specified by the </a:t>
-            </a:r>
-            <a:r>
-              <a:rPr lang="en-US" dirty="0" err="1"/>
-              <a:t>lmake.config</a:t>
-            </a:r>
-            <a:r>
-              <a:rPr lang="en-US" dirty="0"/>
-              <a:t> variable</a:t>
-            </a:r>
-          </a:p>
-          <a:p>
-            <a:pPr lvl="1"/>
-            <a:r>
-              <a:rPr lang="en-US" dirty="0"/>
-              <a:t>it contains a default value that can be overwritten by </a:t>
-            </a:r>
-            <a:r>
-              <a:rPr lang="en-US" dirty="0" err="1"/>
-              <a:t>Lmakefile.py</a:t>
-            </a:r>
-            <a:endParaRPr lang="en-US" dirty="0"/>
-          </a:p>
-          <a:p>
-            <a:r>
-              <a:rPr lang="en-US" dirty="0" err="1"/>
-              <a:t>cf</a:t>
-            </a:r>
-            <a:r>
-              <a:rPr lang="en-US" dirty="0"/>
-              <a:t> </a:t>
-            </a:r>
-            <a:r>
-              <a:rPr lang="en-US" dirty="0" err="1"/>
-              <a:t>lmake.py</a:t>
-            </a:r>
-            <a:r>
-              <a:rPr lang="en-US" dirty="0"/>
-              <a:t> file for a detailed description of the entries and the </a:t>
-            </a:r>
-            <a:r>
-              <a:rPr lang="en-US"/>
-              <a:t>default values</a:t>
-            </a:r>
-            <a:endParaRPr lang="en-US" dirty="0"/>
-          </a:p>
-        </p:txBody>
-      </p:sp>
-      <p:sp>
-        <p:nvSpPr>
-          <p:cNvPr id="2" name="Titre 1">
-            <a:extLst>
-              <a:ext uri="{FF2B5EF4-FFF2-40B4-BE49-F238E27FC236}">
-                <a16:creationId xmlns:a16="http://schemas.microsoft.com/office/drawing/2014/main" id="{4A05D434-ED4E-1367-0603-31E95C2B623B}"/>
-              </a:ext>
-            </a:extLst>
-          </p:cNvPr>
-          <p:cNvSpPr>
-            <a:spLocks noGrp="1"/>
-          </p:cNvSpPr>
-          <p:nvPr>
-            <p:ph type="title"/>
-          </p:nvPr>
-        </p:nvSpPr>
-        <p:spPr/>
-        <p:txBody>
-          <a:bodyPr/>
-          <a:lstStyle/>
-          <a:p>
-            <a:r>
-              <a:rPr lang="en-US" dirty="0"/>
-              <a:t>config</a:t>
-            </a:r>
-          </a:p>
-        </p:txBody>
-      </p:sp>
-    </p:spTree>
-    <p:extLst>
-      <p:ext uri="{BB962C8B-B14F-4D97-AF65-F5344CB8AC3E}">
-        <p14:creationId xmlns:p14="http://schemas.microsoft.com/office/powerpoint/2010/main" val="133917431"/>
-      </p:ext>
-    </p:extLst>
-  </p:cSld>
-  <p:clrMapOvr>
-    <a:masterClrMapping/>
-  </p:clrMapOvr>
-</p:sld>
-</file>
-
-<file path=ppt/slides/slide43.xml><?xml version="1.0" encoding="utf-8"?>
-<p:sld xmlns:a="http://schemas.openxmlformats.org/drawingml/2006/main" xmlns:r="http://schemas.openxmlformats.org/officeDocument/2006/relationships" xmlns:p="http://schemas.openxmlformats.org/presentationml/2006/main">
-  <p:cSld>
-    <p:spTree>
-      <p:nvGrpSpPr>
-        <p:cNvPr id="1" name=""/>
-        <p:cNvGrpSpPr/>
-        <p:nvPr/>
-      </p:nvGrpSpPr>
-      <p:grpSpPr>
-        <a:xfrm>
-          <a:off x="0" y="0"/>
-          <a:ext cx="0" cy="0"/>
-          <a:chOff x="0" y="0"/>
-          <a:chExt cx="0" cy="0"/>
-        </a:xfrm>
-      </p:grpSpPr>
-      <p:sp>
-        <p:nvSpPr>
-          <p:cNvPr id="8" name="Espace réservé du contenu 7">
-            <a:extLst>
-              <a:ext uri="{FF2B5EF4-FFF2-40B4-BE49-F238E27FC236}">
-                <a16:creationId xmlns:a16="http://schemas.microsoft.com/office/drawing/2014/main" id="{A7E8E504-50C8-A9BF-67FC-E0FB31D86F6F}"/>
-              </a:ext>
-            </a:extLst>
-          </p:cNvPr>
-          <p:cNvSpPr>
-            <a:spLocks noGrp="1"/>
-          </p:cNvSpPr>
-          <p:nvPr>
-            <p:ph idx="1"/>
-          </p:nvPr>
-        </p:nvSpPr>
-        <p:spPr/>
-        <p:txBody>
-          <a:bodyPr/>
-          <a:lstStyle/>
-          <a:p>
-            <a:r>
-              <a:rPr lang="en-US" dirty="0"/>
-              <a:t>Normally, writing to stderr is a reason for a job to be in error</a:t>
-            </a:r>
-          </a:p>
-          <a:p>
-            <a:r>
-              <a:rPr lang="en-US" dirty="0"/>
-              <a:t>This can be turned into a warning by setting the </a:t>
-            </a:r>
-            <a:r>
-              <a:rPr lang="en-US" dirty="0" err="1"/>
-              <a:t>allow_stderr</a:t>
-            </a:r>
-            <a:r>
-              <a:rPr lang="en-US" dirty="0"/>
-              <a:t> attribute to True</a:t>
-            </a:r>
-          </a:p>
-        </p:txBody>
-      </p:sp>
-      <p:sp>
-        <p:nvSpPr>
-          <p:cNvPr id="2" name="Titre 1">
-            <a:extLst>
-              <a:ext uri="{FF2B5EF4-FFF2-40B4-BE49-F238E27FC236}">
-                <a16:creationId xmlns:a16="http://schemas.microsoft.com/office/drawing/2014/main" id="{4A05D434-ED4E-1367-0603-31E95C2B623B}"/>
-              </a:ext>
-            </a:extLst>
-          </p:cNvPr>
-          <p:cNvSpPr>
-            <a:spLocks noGrp="1"/>
-          </p:cNvSpPr>
-          <p:nvPr>
-            <p:ph type="title"/>
-          </p:nvPr>
-        </p:nvSpPr>
-        <p:spPr/>
-        <p:txBody>
-          <a:bodyPr/>
-          <a:lstStyle/>
-          <a:p>
-            <a:r>
-              <a:rPr lang="en-US" dirty="0"/>
-              <a:t>stderr</a:t>
-            </a:r>
-          </a:p>
-        </p:txBody>
-      </p:sp>
-    </p:spTree>
-    <p:extLst>
-      <p:ext uri="{BB962C8B-B14F-4D97-AF65-F5344CB8AC3E}">
-        <p14:creationId xmlns:p14="http://schemas.microsoft.com/office/powerpoint/2010/main" val="3885853816"/>
-      </p:ext>
-    </p:extLst>
-  </p:cSld>
-  <p:clrMapOvr>
-    <a:masterClrMapping/>
-  </p:clrMapOvr>
-</p:sld>
-</file>
-
-<file path=ppt/slides/slide44.xml><?xml version="1.0" encoding="utf-8"?>
-<p:sld xmlns:a="http://schemas.openxmlformats.org/drawingml/2006/main" xmlns:r="http://schemas.openxmlformats.org/officeDocument/2006/relationships" xmlns:p="http://schemas.openxmlformats.org/presentationml/2006/main">
-  <p:cSld>
-    <p:spTree>
-      <p:nvGrpSpPr>
-        <p:cNvPr id="1" name=""/>
-        <p:cNvGrpSpPr/>
-        <p:nvPr/>
-      </p:nvGrpSpPr>
-      <p:grpSpPr>
-        <a:xfrm>
-          <a:off x="0" y="0"/>
-          <a:ext cx="0" cy="0"/>
-          <a:chOff x="0" y="0"/>
-          <a:chExt cx="0" cy="0"/>
-        </a:xfrm>
-      </p:grpSpPr>
-      <p:sp>
-        <p:nvSpPr>
-          <p:cNvPr id="8" name="Espace réservé du contenu 7">
-            <a:extLst>
-              <a:ext uri="{FF2B5EF4-FFF2-40B4-BE49-F238E27FC236}">
-                <a16:creationId xmlns:a16="http://schemas.microsoft.com/office/drawing/2014/main" id="{A7E8E504-50C8-A9BF-67FC-E0FB31D86F6F}"/>
-              </a:ext>
-            </a:extLst>
-          </p:cNvPr>
-          <p:cNvSpPr>
-            <a:spLocks noGrp="1"/>
-          </p:cNvSpPr>
-          <p:nvPr>
-            <p:ph idx="1"/>
-          </p:nvPr>
-        </p:nvSpPr>
-        <p:spPr/>
-        <p:txBody>
-          <a:bodyPr/>
-          <a:lstStyle/>
-          <a:p>
-            <a:r>
-              <a:rPr lang="en-US" dirty="0"/>
-              <a:t>Normally, jobs are only executed when a required target is out-of-date</a:t>
-            </a:r>
-          </a:p>
-          <a:p>
-            <a:r>
-              <a:rPr lang="en-US" dirty="0"/>
-              <a:t>However, you can force jobs to be always executed, as if they were never up-to-date</a:t>
-            </a:r>
-          </a:p>
-          <a:p>
-            <a:r>
-              <a:rPr lang="en-US" dirty="0"/>
-              <a:t>This is done by setting the force attribute to True</a:t>
-            </a:r>
-          </a:p>
-        </p:txBody>
-      </p:sp>
-      <p:sp>
-        <p:nvSpPr>
-          <p:cNvPr id="2" name="Titre 1">
-            <a:extLst>
-              <a:ext uri="{FF2B5EF4-FFF2-40B4-BE49-F238E27FC236}">
-                <a16:creationId xmlns:a16="http://schemas.microsoft.com/office/drawing/2014/main" id="{4A05D434-ED4E-1367-0603-31E95C2B623B}"/>
-              </a:ext>
-            </a:extLst>
-          </p:cNvPr>
-          <p:cNvSpPr>
-            <a:spLocks noGrp="1"/>
-          </p:cNvSpPr>
-          <p:nvPr>
-            <p:ph type="title"/>
-          </p:nvPr>
-        </p:nvSpPr>
-        <p:spPr/>
-        <p:txBody>
-          <a:bodyPr/>
-          <a:lstStyle/>
-          <a:p>
-            <a:r>
-              <a:rPr lang="en-US" dirty="0"/>
-              <a:t>force</a:t>
-            </a:r>
-          </a:p>
-        </p:txBody>
-      </p:sp>
-    </p:spTree>
-    <p:extLst>
-      <p:ext uri="{BB962C8B-B14F-4D97-AF65-F5344CB8AC3E}">
-        <p14:creationId xmlns:p14="http://schemas.microsoft.com/office/powerpoint/2010/main" val="1351018713"/>
-      </p:ext>
-    </p:extLst>
-  </p:cSld>
-  <p:clrMapOvr>
-    <a:masterClrMapping/>
-  </p:clrMapOvr>
-</p:sld>
-</file>
-
-<file path=ppt/slides/slide45.xml><?xml version="1.0" encoding="utf-8"?>
-<p:sld xmlns:a="http://schemas.openxmlformats.org/drawingml/2006/main" xmlns:r="http://schemas.openxmlformats.org/officeDocument/2006/relationships" xmlns:p="http://schemas.openxmlformats.org/presentationml/2006/main">
-  <p:cSld>
-    <p:spTree>
-      <p:nvGrpSpPr>
-        <p:cNvPr id="1" name=""/>
-        <p:cNvGrpSpPr/>
-        <p:nvPr/>
-      </p:nvGrpSpPr>
-      <p:grpSpPr>
-        <a:xfrm>
-          <a:off x="0" y="0"/>
-          <a:ext cx="0" cy="0"/>
-          <a:chOff x="0" y="0"/>
-          <a:chExt cx="0" cy="0"/>
-        </a:xfrm>
-      </p:grpSpPr>
-      <p:sp>
-        <p:nvSpPr>
-          <p:cNvPr id="8" name="Espace réservé du contenu 7">
-            <a:extLst>
-              <a:ext uri="{FF2B5EF4-FFF2-40B4-BE49-F238E27FC236}">
-                <a16:creationId xmlns:a16="http://schemas.microsoft.com/office/drawing/2014/main" id="{A7E8E504-50C8-A9BF-67FC-E0FB31D86F6F}"/>
-              </a:ext>
-            </a:extLst>
-          </p:cNvPr>
-          <p:cNvSpPr>
-            <a:spLocks noGrp="1"/>
-          </p:cNvSpPr>
-          <p:nvPr>
-            <p:ph idx="1"/>
-          </p:nvPr>
-        </p:nvSpPr>
-        <p:spPr/>
-        <p:txBody>
-          <a:bodyPr/>
-          <a:lstStyle/>
-          <a:p>
-            <a:r>
-              <a:rPr lang="en-US" dirty="0"/>
-              <a:t>tokens are specified with the attributes</a:t>
-            </a:r>
-          </a:p>
-          <a:p>
-            <a:pPr lvl="1"/>
-            <a:r>
-              <a:rPr lang="en-US" dirty="0" err="1"/>
-              <a:t>n_tokens</a:t>
-            </a:r>
-            <a:r>
-              <a:rPr lang="en-US" dirty="0"/>
-              <a:t> : provide a global number for all the running jobs of this rule, it must be a int</a:t>
-            </a:r>
-          </a:p>
-          <a:p>
-            <a:pPr lvl="1"/>
-            <a:r>
-              <a:rPr lang="en-US" dirty="0"/>
-              <a:t>tokens : provide the number of tokens for a particular job, expressed with the same syntax as deps, converted to a int </a:t>
-            </a:r>
-            <a:r>
-              <a:rPr lang="en-US" dirty="0" err="1"/>
-              <a:t>aftert</a:t>
-            </a:r>
-            <a:r>
-              <a:rPr lang="en-US" dirty="0"/>
-              <a:t> f-string interpretation if necessary</a:t>
-            </a:r>
-          </a:p>
-          <a:p>
-            <a:r>
-              <a:rPr lang="en-US" dirty="0"/>
-              <a:t>tokens are only used to estimate the ETA</a:t>
-            </a:r>
-          </a:p>
-          <a:p>
-            <a:pPr lvl="1"/>
-            <a:r>
-              <a:rPr lang="en-US" dirty="0"/>
-              <a:t>they are not used to reserve resources</a:t>
-            </a:r>
-          </a:p>
-        </p:txBody>
-      </p:sp>
-      <p:sp>
-        <p:nvSpPr>
-          <p:cNvPr id="2" name="Titre 1">
-            <a:extLst>
-              <a:ext uri="{FF2B5EF4-FFF2-40B4-BE49-F238E27FC236}">
-                <a16:creationId xmlns:a16="http://schemas.microsoft.com/office/drawing/2014/main" id="{4A05D434-ED4E-1367-0603-31E95C2B623B}"/>
-              </a:ext>
-            </a:extLst>
-          </p:cNvPr>
-          <p:cNvSpPr>
-            <a:spLocks noGrp="1"/>
-          </p:cNvSpPr>
-          <p:nvPr>
-            <p:ph type="title"/>
-          </p:nvPr>
-        </p:nvSpPr>
-        <p:spPr/>
-        <p:txBody>
-          <a:bodyPr/>
-          <a:lstStyle/>
-          <a:p>
-            <a:r>
-              <a:rPr lang="en-US" dirty="0"/>
-              <a:t>tokens</a:t>
-            </a:r>
-          </a:p>
-        </p:txBody>
-      </p:sp>
-    </p:spTree>
-    <p:extLst>
-      <p:ext uri="{BB962C8B-B14F-4D97-AF65-F5344CB8AC3E}">
-        <p14:creationId xmlns:p14="http://schemas.microsoft.com/office/powerpoint/2010/main" val="1990936158"/>
-      </p:ext>
-    </p:extLst>
-  </p:cSld>
-  <p:clrMapOvr>
-    <a:masterClrMapping/>
-  </p:clrMapOvr>
-</p:sld>
-</file>
-
-<file path=ppt/slides/slide46.xml><?xml version="1.0" encoding="utf-8"?>
-<p:sld xmlns:a="http://schemas.openxmlformats.org/drawingml/2006/main" xmlns:r="http://schemas.openxmlformats.org/officeDocument/2006/relationships" xmlns:p="http://schemas.openxmlformats.org/presentationml/2006/main">
-  <p:cSld>
-    <p:spTree>
-      <p:nvGrpSpPr>
-        <p:cNvPr id="1" name=""/>
-        <p:cNvGrpSpPr/>
-        <p:nvPr/>
-      </p:nvGrpSpPr>
-      <p:grpSpPr>
-        <a:xfrm>
-          <a:off x="0" y="0"/>
-          <a:ext cx="0" cy="0"/>
-          <a:chOff x="0" y="0"/>
-          <a:chExt cx="0" cy="0"/>
-        </a:xfrm>
-      </p:grpSpPr>
-      <p:sp>
-        <p:nvSpPr>
-          <p:cNvPr id="8" name="Espace réservé du contenu 7">
-            <a:extLst>
-              <a:ext uri="{FF2B5EF4-FFF2-40B4-BE49-F238E27FC236}">
-                <a16:creationId xmlns:a16="http://schemas.microsoft.com/office/drawing/2014/main" id="{A7E8E504-50C8-A9BF-67FC-E0FB31D86F6F}"/>
-              </a:ext>
-            </a:extLst>
-          </p:cNvPr>
-          <p:cNvSpPr>
-            <a:spLocks noGrp="1"/>
-          </p:cNvSpPr>
-          <p:nvPr>
-            <p:ph idx="1"/>
-          </p:nvPr>
-        </p:nvSpPr>
-        <p:spPr/>
-        <p:txBody>
-          <a:bodyPr/>
-          <a:lstStyle/>
-          <a:p>
-            <a:r>
-              <a:rPr lang="en-US" dirty="0"/>
-              <a:t>Jobs are normally never killed</a:t>
-            </a:r>
-          </a:p>
-          <a:p>
-            <a:r>
-              <a:rPr lang="en-US" dirty="0"/>
-              <a:t>They may be killed, though, if user type ^C</a:t>
+          <a:bodyPr>
+            <a:normAutofit fontScale="85000" lnSpcReduction="20000"/>
+          </a:bodyPr>
+          <a:lstStyle/>
+          <a:p>
+            <a:r>
+              <a:rPr lang="en-US" dirty="0"/>
+              <a:t>Jobs are normally not killed</a:t>
+            </a:r>
+          </a:p>
+          <a:p>
+            <a:r>
+              <a:rPr lang="en-US" dirty="0"/>
+              <a:t>They may be killed, though, if user types ^C</a:t>
             </a:r>
           </a:p>
           <a:p>
@@ -12256,18 +11399,32 @@
           <a:p>
             <a:r>
               <a:rPr lang="en-US" dirty="0"/>
-              <a:t>In that case a signal is delivered to the job as a process group</a:t>
+              <a:t>In that case :</a:t>
             </a:r>
           </a:p>
           <a:p>
             <a:pPr lvl="1"/>
             <a:r>
               <a:rPr lang="en-US" dirty="0"/>
+              <a:t>with the local backend</a:t>
+            </a:r>
+          </a:p>
+          <a:p>
+            <a:pPr lvl="2"/>
+            <a:r>
+              <a:rPr lang="en-US" dirty="0"/>
+              <a:t>a signal is delivered to the job as a process group</a:t>
+            </a:r>
+          </a:p>
+          <a:p>
+            <a:pPr lvl="2"/>
+            <a:r>
+              <a:rPr lang="en-US" dirty="0"/>
               <a:t>The delivered signal is SIGKILL (9) by default</a:t>
             </a:r>
           </a:p>
           <a:p>
-            <a:pPr lvl="1"/>
+            <a:pPr lvl="2"/>
             <a:r>
               <a:rPr lang="en-US" dirty="0"/>
               <a:t>This signal may be explicitly mentioned in the rule as the </a:t>
@@ -12279,6 +11436,68 @@
             <a:r>
               <a:rPr lang="en-US" dirty="0"/>
               <a:t> attribute</a:t>
+            </a:r>
+          </a:p>
+          <a:p>
+            <a:pPr lvl="1"/>
+            <a:r>
+              <a:rPr lang="en-US" dirty="0"/>
+              <a:t>with the </a:t>
+            </a:r>
+            <a:r>
+              <a:rPr lang="en-US" dirty="0" err="1"/>
+              <a:t>slurm</a:t>
+            </a:r>
+            <a:r>
+              <a:rPr lang="en-US" dirty="0"/>
+              <a:t> backend</a:t>
+            </a:r>
+          </a:p>
+          <a:p>
+            <a:pPr lvl="2"/>
+            <a:r>
+              <a:rPr lang="en-US" dirty="0"/>
+              <a:t>the API is used similarly to a </a:t>
+            </a:r>
+            <a:r>
+              <a:rPr lang="en-US" dirty="0" err="1"/>
+              <a:t>scancel</a:t>
+            </a:r>
+            <a:r>
+              <a:rPr lang="en-US" dirty="0"/>
+              <a:t> command</a:t>
+            </a:r>
+          </a:p>
+          <a:p>
+            <a:pPr lvl="1"/>
+            <a:r>
+              <a:rPr lang="en-US" dirty="0"/>
+              <a:t>with the SGE backend</a:t>
+            </a:r>
+          </a:p>
+          <a:p>
+            <a:pPr lvl="2"/>
+            <a:r>
+              <a:rPr lang="en-US" dirty="0" err="1"/>
+              <a:t>qdel</a:t>
+            </a:r>
+            <a:r>
+              <a:rPr lang="en-US" dirty="0"/>
+              <a:t> is issued</a:t>
+            </a:r>
+          </a:p>
+          <a:p>
+            <a:r>
+              <a:rPr lang="en-US" dirty="0"/>
+              <a:t>If the job is interrupted for some external reason (e.g. the user uses </a:t>
+            </a:r>
+            <a:r>
+              <a:rPr lang="en-US" dirty="0" err="1"/>
+              <a:t>scancel</a:t>
+            </a:r>
+            <a:r>
+              <a:rPr lang="en-US" dirty="0"/>
+              <a:t>), the job is rerun</a:t>
             </a:r>
           </a:p>
         </p:txBody>
@@ -12315,153 +11534,6 @@
     <p:extLst>
       <p:ext uri="{BB962C8B-B14F-4D97-AF65-F5344CB8AC3E}">
         <p14:creationId xmlns:p14="http://schemas.microsoft.com/office/powerpoint/2010/main" val="3135868816"/>
-      </p:ext>
-    </p:extLst>
-  </p:cSld>
-  <p:clrMapOvr>
-    <a:masterClrMapping/>
-  </p:clrMapOvr>
-</p:sld>
-</file>
-
-<file path=ppt/slides/slide47.xml><?xml version="1.0" encoding="utf-8"?>
-<p:sld xmlns:a="http://schemas.openxmlformats.org/drawingml/2006/main" xmlns:r="http://schemas.openxmlformats.org/officeDocument/2006/relationships" xmlns:p="http://schemas.openxmlformats.org/presentationml/2006/main">
-  <p:cSld>
-    <p:spTree>
-      <p:nvGrpSpPr>
-        <p:cNvPr id="1" name=""/>
-        <p:cNvGrpSpPr/>
-        <p:nvPr/>
-      </p:nvGrpSpPr>
-      <p:grpSpPr>
-        <a:xfrm>
-          <a:off x="0" y="0"/>
-          <a:ext cx="0" cy="0"/>
-          <a:chOff x="0" y="0"/>
-          <a:chExt cx="0" cy="0"/>
-        </a:xfrm>
-      </p:grpSpPr>
-      <p:sp>
-        <p:nvSpPr>
-          <p:cNvPr id="8" name="Espace réservé du contenu 7">
-            <a:extLst>
-              <a:ext uri="{FF2B5EF4-FFF2-40B4-BE49-F238E27FC236}">
-                <a16:creationId xmlns:a16="http://schemas.microsoft.com/office/drawing/2014/main" id="{A7E8E504-50C8-A9BF-67FC-E0FB31D86F6F}"/>
-              </a:ext>
-            </a:extLst>
-          </p:cNvPr>
-          <p:cNvSpPr>
-            <a:spLocks noGrp="1"/>
-          </p:cNvSpPr>
-          <p:nvPr>
-            <p:ph idx="1"/>
-          </p:nvPr>
-        </p:nvSpPr>
-        <p:spPr/>
-        <p:txBody>
-          <a:bodyPr>
-            <a:normAutofit lnSpcReduction="10000"/>
-          </a:bodyPr>
-          <a:lstStyle/>
-          <a:p>
-            <a:r>
-              <a:rPr lang="en-US" dirty="0"/>
-              <a:t>ETA means Estimated Time of Arrival</a:t>
-            </a:r>
-          </a:p>
-          <a:p>
-            <a:r>
-              <a:rPr lang="en-US" dirty="0"/>
-              <a:t>It is the anticipated date/time at which </a:t>
-            </a:r>
-            <a:r>
-              <a:rPr lang="en-US" dirty="0" err="1"/>
-              <a:t>lmake</a:t>
-            </a:r>
-            <a:r>
-              <a:rPr lang="en-US" dirty="0"/>
-              <a:t> thinks a request (i.e. a </a:t>
-            </a:r>
-            <a:r>
-              <a:rPr lang="en-US" dirty="0" err="1"/>
-              <a:t>lmake</a:t>
-            </a:r>
-            <a:r>
-              <a:rPr lang="en-US" dirty="0"/>
-              <a:t> command) will be done</a:t>
-            </a:r>
-          </a:p>
-          <a:p>
-            <a:r>
-              <a:rPr lang="en-US" dirty="0"/>
-              <a:t>To launch jobs, the local backend select the first possible by priority :</a:t>
-            </a:r>
-          </a:p>
-          <a:p>
-            <a:pPr lvl="1"/>
-            <a:r>
-              <a:rPr lang="en-US" dirty="0"/>
-              <a:t>job is eligible if its necessary resources fit within the pool</a:t>
-            </a:r>
-          </a:p>
-          <a:p>
-            <a:pPr lvl="1"/>
-            <a:r>
-              <a:rPr lang="en-US" dirty="0"/>
-              <a:t>jobs necessary for request with earlier ETA have priority over jobs necessary for requests with later ETA</a:t>
-            </a:r>
-          </a:p>
-          <a:p>
-            <a:pPr lvl="1"/>
-            <a:r>
-              <a:rPr lang="en-US" dirty="0"/>
-              <a:t>within a request, jobs with higher pressure have priority over jobs with lower pressure</a:t>
-            </a:r>
-          </a:p>
-          <a:p>
-            <a:r>
-              <a:rPr lang="en-US" dirty="0"/>
-              <a:t>Job pressure is defined as the sum of the estimated time of all the jobs on the dependency path to the request end</a:t>
-            </a:r>
-          </a:p>
-          <a:p>
-            <a:pPr lvl="1"/>
-            <a:endParaRPr lang="en-US" dirty="0"/>
-          </a:p>
-        </p:txBody>
-      </p:sp>
-      <p:sp>
-        <p:nvSpPr>
-          <p:cNvPr id="2" name="Titre 1">
-            <a:extLst>
-              <a:ext uri="{FF2B5EF4-FFF2-40B4-BE49-F238E27FC236}">
-                <a16:creationId xmlns:a16="http://schemas.microsoft.com/office/drawing/2014/main" id="{4A05D434-ED4E-1367-0603-31E95C2B623B}"/>
-              </a:ext>
-            </a:extLst>
-          </p:cNvPr>
-          <p:cNvSpPr>
-            <a:spLocks noGrp="1"/>
-          </p:cNvSpPr>
-          <p:nvPr>
-            <p:ph type="title"/>
-          </p:nvPr>
-        </p:nvSpPr>
-        <p:spPr/>
-        <p:txBody>
-          <a:bodyPr/>
-          <a:lstStyle/>
-          <a:p>
-            <a:r>
-              <a:rPr lang="en-US" dirty="0"/>
-              <a:t>ETA</a:t>
-            </a:r>
-          </a:p>
-        </p:txBody>
-      </p:sp>
-    </p:spTree>
-    <p:extLst>
-      <p:ext uri="{BB962C8B-B14F-4D97-AF65-F5344CB8AC3E}">
-        <p14:creationId xmlns:p14="http://schemas.microsoft.com/office/powerpoint/2010/main" val="2338277956"/>
       </p:ext>
     </p:extLst>
   </p:cSld>

</xml_diff>